<commit_message>
Added sections (might need to cut down on transitions)
</commit_message>
<xml_diff>
--- a/Information/Präsentation.pptx
+++ b/Information/Präsentation.pptx
@@ -7,10 +7,19 @@
   <p:sldIdLst>
     <p:sldId id="256" r:id="rId2"/>
     <p:sldId id="257" r:id="rId3"/>
-    <p:sldId id="263" r:id="rId4"/>
+    <p:sldId id="271" r:id="rId4"/>
     <p:sldId id="259" r:id="rId5"/>
     <p:sldId id="260" r:id="rId6"/>
     <p:sldId id="262" r:id="rId7"/>
+    <p:sldId id="272" r:id="rId8"/>
+    <p:sldId id="268" r:id="rId9"/>
+    <p:sldId id="270" r:id="rId10"/>
+    <p:sldId id="269" r:id="rId11"/>
+    <p:sldId id="263" r:id="rId12"/>
+    <p:sldId id="264" r:id="rId13"/>
+    <p:sldId id="265" r:id="rId14"/>
+    <p:sldId id="266" r:id="rId15"/>
+    <p:sldId id="267" r:id="rId16"/>
   </p:sldIdLst>
   <p:sldSz cx="12192000" cy="6858000"/>
   <p:notesSz cx="6858000" cy="9144000"/>
@@ -120,7 +129,7 @@
         </p14:section>
         <p14:section name="Zusammenfassungsabschnitt" id="{01741FEB-0D38-484A-854A-F31003BA69A0}">
           <p14:sldIdLst>
-            <p14:sldId id="263"/>
+            <p14:sldId id="271"/>
           </p14:sldIdLst>
         </p14:section>
         <p14:section name="Hintergrund" id="{448C54FB-7A7F-4DE3-931A-5B530A9D04AF}">
@@ -132,9 +141,53 @@
         <p14:section name="Formale Elemente" id="{0A0AD3E9-F226-499F-A6A9-475BBDC8260B}">
           <p14:sldIdLst>
             <p14:sldId id="262"/>
+            <p14:sldId id="272"/>
+          </p14:sldIdLst>
+        </p14:section>
+        <p14:section name="Spieler (Zielgruppe)" id="{2D74ECE9-51AA-48B2-A681-1B700657B38C}">
+          <p14:sldIdLst>
+            <p14:sldId id="268"/>
+          </p14:sldIdLst>
+        </p14:section>
+        <p14:section name="Gegenstand und Ziel des Spiels" id="{3416F951-5A24-405D-9DA1-EF4A54895E36}">
+          <p14:sldIdLst>
+            <p14:sldId id="270"/>
+          </p14:sldIdLst>
+        </p14:section>
+        <p14:section name="Abläufe" id="{FBA0BB86-F06D-4BA0-983B-4B94ED8FA917}">
+          <p14:sldIdLst>
+            <p14:sldId id="269"/>
+          </p14:sldIdLst>
+        </p14:section>
+        <p14:section name="Regeln" id="{4EAB2BE6-6483-4DE4-B885-F8A04D3A5DC6}">
+          <p14:sldIdLst>
+            <p14:sldId id="263"/>
+          </p14:sldIdLst>
+        </p14:section>
+        <p14:section name="Resourcen" id="{F5254605-6156-463A-9D1F-716FC09734B6}">
+          <p14:sldIdLst>
+            <p14:sldId id="264"/>
+          </p14:sldIdLst>
+        </p14:section>
+        <p14:section name="(Potenzielle) Konflikte, absehbare Schwierigkeiten" id="{71526EA7-9B9A-4FE5-B037-5674774363E2}">
+          <p14:sldIdLst>
+            <p14:sldId id="265"/>
+          </p14:sldIdLst>
+        </p14:section>
+        <p14:section name="Rahmenbedingungen" id="{D6A69A88-33A5-4091-A66E-533B9558B68E}">
+          <p14:sldIdLst>
+            <p14:sldId id="266"/>
+          </p14:sldIdLst>
+        </p14:section>
+        <p14:section name="Ergebnisse" id="{B62DC81D-7119-4DBA-A8F1-949B2D1686E3}">
+          <p14:sldIdLst>
+            <p14:sldId id="267"/>
           </p14:sldIdLst>
         </p14:section>
       </p14:sectionLst>
+    </p:ext>
+    <p:ext uri="{EFAFB233-063F-42B5-8137-9DF3F51BA10A}">
+      <p15:sldGuideLst xmlns:p15="http://schemas.microsoft.com/office/powerpoint/2012/main"/>
     </p:ext>
   </p:extLst>
 </p:presentation>
@@ -289,7 +342,7 @@
           <a:effectLst/>
           <a:extLst>
             <a:ext uri="{91240B29-F687-4f45-9708-019B960494DF}">
-              <a14:hiddenLine xmlns:a14="http://schemas.microsoft.com/office/drawing/2010/main" xmlns="" w="9525">
+              <a14:hiddenLine xmlns="" xmlns:a14="http://schemas.microsoft.com/office/drawing/2010/main" w="9525">
                 <a:solidFill>
                   <a:srgbClr val="000000"/>
                 </a:solidFill>
@@ -482,7 +535,7 @@
             <a:fld id="{08B9EBBA-996F-894A-B54A-D6246ED52CEA}" type="datetimeFigureOut">
               <a:rPr lang="en-US" dirty="0"/>
               <a:pPr/>
-              <a:t>4/29/2019</a:t>
+              <a:t>4/30/2019</a:t>
             </a:fld>
             <a:endParaRPr lang="en-US" dirty="0"/>
           </a:p>
@@ -525,7 +578,7 @@
             <a:fld id="{D57F1E4F-1CFF-5643-939E-217C01CDF565}" type="slidenum">
               <a:rPr lang="en-US" dirty="0"/>
               <a:pPr/>
-              <a:t>‹Nr.›</a:t>
+              <a:t>‹#›</a:t>
             </a:fld>
             <a:endParaRPr lang="en-US" dirty="0"/>
           </a:p>
@@ -797,7 +850,7 @@
             <a:fld id="{18C79C5D-2A6F-F04D-97DA-BEF2467B64E4}" type="datetimeFigureOut">
               <a:rPr lang="en-US" dirty="0"/>
               <a:pPr/>
-              <a:t>4/29/2019</a:t>
+              <a:t>4/30/2019</a:t>
             </a:fld>
             <a:endParaRPr lang="en-US" dirty="0"/>
           </a:p>
@@ -840,7 +893,7 @@
             <a:fld id="{D57F1E4F-1CFF-5643-939E-217C01CDF565}" type="slidenum">
               <a:rPr lang="en-US" dirty="0"/>
               <a:pPr/>
-              <a:t>‹Nr.›</a:t>
+              <a:t>‹#›</a:t>
             </a:fld>
             <a:endParaRPr lang="en-US" dirty="0"/>
           </a:p>
@@ -1282,7 +1335,7 @@
             <a:fld id="{8DFA1846-DA80-1C48-A609-854EA85C59AD}" type="datetimeFigureOut">
               <a:rPr lang="en-US" dirty="0"/>
               <a:pPr/>
-              <a:t>4/29/2019</a:t>
+              <a:t>4/30/2019</a:t>
             </a:fld>
             <a:endParaRPr lang="en-US" dirty="0"/>
           </a:p>
@@ -1325,7 +1378,7 @@
             <a:fld id="{D57F1E4F-1CFF-5643-939E-217C01CDF565}" type="slidenum">
               <a:rPr lang="en-US" dirty="0"/>
               <a:pPr/>
-              <a:t>‹Nr.›</a:t>
+              <a:t>‹#›</a:t>
             </a:fld>
             <a:endParaRPr lang="en-US" dirty="0"/>
           </a:p>
@@ -1648,7 +1701,7 @@
             <a:fld id="{FBF54567-0DE4-3F47-BF90-CB84690072F9}" type="datetimeFigureOut">
               <a:rPr lang="en-US" dirty="0"/>
               <a:pPr/>
-              <a:t>4/29/2019</a:t>
+              <a:t>4/30/2019</a:t>
             </a:fld>
             <a:endParaRPr lang="en-US" dirty="0"/>
           </a:p>
@@ -1691,7 +1744,7 @@
             <a:fld id="{D57F1E4F-1CFF-5643-939E-217C01CDF565}" type="slidenum">
               <a:rPr lang="en-US" dirty="0"/>
               <a:pPr/>
-              <a:t>‹Nr.›</a:t>
+              <a:t>‹#›</a:t>
             </a:fld>
             <a:endParaRPr lang="en-US" dirty="0"/>
           </a:p>
@@ -1799,7 +1852,7 @@
           <a:ln/>
           <a:extLst>
             <a:ext uri="{91240B29-F687-4f45-9708-019B960494DF}">
-              <a14:hiddenLine xmlns:a14="http://schemas.microsoft.com/office/drawing/2010/main" xmlns="" w="9525">
+              <a14:hiddenLine xmlns="" xmlns:a14="http://schemas.microsoft.com/office/drawing/2010/main" w="9525">
                 <a:solidFill>
                   <a:srgbClr val="000000"/>
                 </a:solidFill>
@@ -1918,7 +1971,7 @@
             <a:fld id="{C6C52C72-DE31-F449-A4ED-4C594FD91407}" type="datetimeFigureOut">
               <a:rPr lang="en-US" dirty="0"/>
               <a:pPr/>
-              <a:t>4/29/2019</a:t>
+              <a:t>4/30/2019</a:t>
             </a:fld>
             <a:endParaRPr lang="en-US" dirty="0"/>
           </a:p>
@@ -1961,7 +2014,7 @@
             <a:fld id="{D57F1E4F-1CFF-5643-939E-217C01CDF565}" type="slidenum">
               <a:rPr lang="en-US" dirty="0"/>
               <a:pPr/>
-              <a:t>‹Nr.›</a:t>
+              <a:t>‹#›</a:t>
             </a:fld>
             <a:endParaRPr lang="en-US" dirty="0"/>
           </a:p>
@@ -2071,7 +2124,7 @@
           <a:ln/>
           <a:extLst>
             <a:ext uri="{91240B29-F687-4f45-9708-019B960494DF}">
-              <a14:hiddenLine xmlns:a14="http://schemas.microsoft.com/office/drawing/2010/main" xmlns="" w="9525">
+              <a14:hiddenLine xmlns="" xmlns:a14="http://schemas.microsoft.com/office/drawing/2010/main" w="9525">
                 <a:solidFill>
                   <a:srgbClr val="000000"/>
                 </a:solidFill>
@@ -2200,7 +2253,7 @@
             <a:fld id="{ED62726E-379B-B349-9EED-81ED093FA806}" type="datetimeFigureOut">
               <a:rPr lang="en-US" dirty="0"/>
               <a:pPr/>
-              <a:t>4/29/2019</a:t>
+              <a:t>4/30/2019</a:t>
             </a:fld>
             <a:endParaRPr lang="en-US" dirty="0"/>
           </a:p>
@@ -2243,7 +2296,7 @@
             <a:fld id="{D57F1E4F-1CFF-5643-939E-217C01CDF565}" type="slidenum">
               <a:rPr lang="en-US" dirty="0"/>
               <a:pPr/>
-              <a:t>‹Nr.›</a:t>
+              <a:t>‹#›</a:t>
             </a:fld>
             <a:endParaRPr lang="en-US" dirty="0"/>
           </a:p>
@@ -2351,7 +2404,7 @@
           <a:ln/>
           <a:extLst>
             <a:ext uri="{91240B29-F687-4f45-9708-019B960494DF}">
-              <a14:hiddenLine xmlns:a14="http://schemas.microsoft.com/office/drawing/2010/main" xmlns="" w="9525">
+              <a14:hiddenLine xmlns="" xmlns:a14="http://schemas.microsoft.com/office/drawing/2010/main" w="9525">
                 <a:solidFill>
                   <a:srgbClr val="000000"/>
                 </a:solidFill>
@@ -2480,7 +2533,7 @@
             <a:fld id="{9B3A1323-8D79-1946-B0D7-40001CF92E9D}" type="datetimeFigureOut">
               <a:rPr lang="en-US" dirty="0"/>
               <a:pPr/>
-              <a:t>4/29/2019</a:t>
+              <a:t>4/30/2019</a:t>
             </a:fld>
             <a:endParaRPr lang="en-US" dirty="0"/>
           </a:p>
@@ -2523,7 +2576,7 @@
             <a:fld id="{D57F1E4F-1CFF-5643-939E-217C01CDF565}" type="slidenum">
               <a:rPr lang="en-US" dirty="0"/>
               <a:pPr/>
-              <a:t>‹Nr.›</a:t>
+              <a:t>‹#›</a:t>
             </a:fld>
             <a:endParaRPr lang="en-US" dirty="0"/>
           </a:p>
@@ -2820,7 +2873,7 @@
             <a:fld id="{8DFA1846-DA80-1C48-A609-854EA85C59AD}" type="datetimeFigureOut">
               <a:rPr lang="en-US" dirty="0"/>
               <a:pPr/>
-              <a:t>4/29/2019</a:t>
+              <a:t>4/30/2019</a:t>
             </a:fld>
             <a:endParaRPr lang="en-US" dirty="0"/>
           </a:p>
@@ -2863,7 +2916,7 @@
             <a:fld id="{D57F1E4F-1CFF-5643-939E-217C01CDF565}" type="slidenum">
               <a:rPr lang="en-US" dirty="0"/>
               <a:pPr/>
-              <a:t>‹Nr.›</a:t>
+              <a:t>‹#›</a:t>
             </a:fld>
             <a:endParaRPr lang="en-US" dirty="0"/>
           </a:p>
@@ -2971,7 +3024,7 @@
           <a:ln/>
           <a:extLst>
             <a:ext uri="{91240B29-F687-4f45-9708-019B960494DF}">
-              <a14:hiddenLine xmlns:a14="http://schemas.microsoft.com/office/drawing/2010/main" xmlns="" w="9525">
+              <a14:hiddenLine xmlns="" xmlns:a14="http://schemas.microsoft.com/office/drawing/2010/main" w="9525">
                 <a:solidFill>
                   <a:srgbClr val="000000"/>
                 </a:solidFill>
@@ -3156,7 +3209,7 @@
             <a:fld id="{57302355-E14B-8545-A8F8-0FE83CC9D524}" type="datetimeFigureOut">
               <a:rPr lang="en-US" dirty="0"/>
               <a:pPr/>
-              <a:t>4/29/2019</a:t>
+              <a:t>4/30/2019</a:t>
             </a:fld>
             <a:endParaRPr lang="en-US" dirty="0"/>
           </a:p>
@@ -3199,7 +3252,7 @@
             <a:fld id="{D57F1E4F-1CFF-5643-939E-217C01CDF565}" type="slidenum">
               <a:rPr lang="en-US" dirty="0"/>
               <a:pPr/>
-              <a:t>‹Nr.›</a:t>
+              <a:t>‹#›</a:t>
             </a:fld>
             <a:endParaRPr lang="en-US" dirty="0"/>
           </a:p>
@@ -3307,7 +3360,7 @@
           <a:ln/>
           <a:extLst>
             <a:ext uri="{91240B29-F687-4f45-9708-019B960494DF}">
-              <a14:hiddenLine xmlns:a14="http://schemas.microsoft.com/office/drawing/2010/main" xmlns="" w="9525">
+              <a14:hiddenLine xmlns="" xmlns:a14="http://schemas.microsoft.com/office/drawing/2010/main" w="9525">
                 <a:solidFill>
                   <a:srgbClr val="000000"/>
                 </a:solidFill>
@@ -3630,7 +3683,7 @@
             <a:fld id="{02640F58-564D-2B4F-AE67-E407BA4FCF45}" type="datetimeFigureOut">
               <a:rPr lang="en-US" dirty="0"/>
               <a:pPr/>
-              <a:t>4/29/2019</a:t>
+              <a:t>4/30/2019</a:t>
             </a:fld>
             <a:endParaRPr lang="en-US" dirty="0"/>
           </a:p>
@@ -3673,7 +3726,7 @@
             <a:fld id="{D57F1E4F-1CFF-5643-939E-217C01CDF565}" type="slidenum">
               <a:rPr lang="en-US" dirty="0"/>
               <a:pPr/>
-              <a:t>‹Nr.›</a:t>
+              <a:t>‹#›</a:t>
             </a:fld>
             <a:endParaRPr lang="en-US" dirty="0"/>
           </a:p>
@@ -3781,7 +3834,7 @@
           <a:ln/>
           <a:extLst>
             <a:ext uri="{91240B29-F687-4f45-9708-019B960494DF}">
-              <a14:hiddenLine xmlns:a14="http://schemas.microsoft.com/office/drawing/2010/main" xmlns="" w="9525">
+              <a14:hiddenLine xmlns="" xmlns:a14="http://schemas.microsoft.com/office/drawing/2010/main" w="9525">
                 <a:solidFill>
                   <a:srgbClr val="000000"/>
                 </a:solidFill>
@@ -3848,7 +3901,7 @@
             <a:fld id="{F13A34C8-038E-2045-AF43-DF7DBB8E0E9E}" type="datetimeFigureOut">
               <a:rPr lang="en-US" dirty="0"/>
               <a:pPr/>
-              <a:t>4/29/2019</a:t>
+              <a:t>4/30/2019</a:t>
             </a:fld>
             <a:endParaRPr lang="en-US" dirty="0"/>
           </a:p>
@@ -3891,7 +3944,7 @@
             <a:fld id="{D57F1E4F-1CFF-5643-939E-217C01CDF565}" type="slidenum">
               <a:rPr lang="en-US" dirty="0"/>
               <a:pPr/>
-              <a:t>‹Nr.›</a:t>
+              <a:t>‹#›</a:t>
             </a:fld>
             <a:endParaRPr lang="en-US" dirty="0"/>
           </a:p>
@@ -3940,7 +3993,7 @@
             <a:fld id="{8818C68F-D26B-8F47-958C-23B49CF8A634}" type="datetimeFigureOut">
               <a:rPr lang="en-US" dirty="0"/>
               <a:pPr/>
-              <a:t>4/29/2019</a:t>
+              <a:t>4/30/2019</a:t>
             </a:fld>
             <a:endParaRPr lang="en-US" dirty="0"/>
           </a:p>
@@ -3983,7 +4036,7 @@
             <a:fld id="{D57F1E4F-1CFF-5643-939E-217C01CDF565}" type="slidenum">
               <a:rPr lang="en-US" dirty="0"/>
               <a:pPr/>
-              <a:t>‹Nr.›</a:t>
+              <a:t>‹#›</a:t>
             </a:fld>
             <a:endParaRPr lang="en-US" dirty="0"/>
           </a:p>
@@ -4204,7 +4257,7 @@
           <a:ln/>
           <a:extLst>
             <a:ext uri="{91240B29-F687-4f45-9708-019B960494DF}">
-              <a14:hiddenLine xmlns:a14="http://schemas.microsoft.com/office/drawing/2010/main" xmlns="" w="9525">
+              <a14:hiddenLine xmlns="" xmlns:a14="http://schemas.microsoft.com/office/drawing/2010/main" w="9525">
                 <a:solidFill>
                   <a:srgbClr val="000000"/>
                 </a:solidFill>
@@ -4404,7 +4457,7 @@
             <a:fld id="{D0DF5E60-9974-AC48-9591-99C2BB44B7CF}" type="datetimeFigureOut">
               <a:rPr lang="en-US" dirty="0"/>
               <a:pPr/>
-              <a:t>4/29/2019</a:t>
+              <a:t>4/30/2019</a:t>
             </a:fld>
             <a:endParaRPr lang="en-US" dirty="0"/>
           </a:p>
@@ -4447,7 +4500,7 @@
             <a:fld id="{D57F1E4F-1CFF-5643-939E-217C01CDF565}" type="slidenum">
               <a:rPr lang="en-US" dirty="0"/>
               <a:pPr/>
-              <a:t>‹Nr.›</a:t>
+              <a:t>‹#›</a:t>
             </a:fld>
             <a:endParaRPr lang="en-US" dirty="0"/>
           </a:p>
@@ -4714,7 +4767,7 @@
             <a:fld id="{18C79C5D-2A6F-F04D-97DA-BEF2467B64E4}" type="datetimeFigureOut">
               <a:rPr lang="en-US" dirty="0"/>
               <a:pPr/>
-              <a:t>4/29/2019</a:t>
+              <a:t>4/30/2019</a:t>
             </a:fld>
             <a:endParaRPr lang="en-US" dirty="0"/>
           </a:p>
@@ -4767,7 +4820,7 @@
             <a:fld id="{D57F1E4F-1CFF-5643-939E-217C01CDF565}" type="slidenum">
               <a:rPr lang="en-US" dirty="0"/>
               <a:pPr/>
-              <a:t>‹Nr.›</a:t>
+              <a:t>‹#›</a:t>
             </a:fld>
             <a:endParaRPr lang="en-US" dirty="0"/>
           </a:p>
@@ -4981,7 +5034,7 @@
             <a:fld id="{09B482E8-6E0E-1B4F-B1FD-C69DB9E858D9}" type="datetimeFigureOut">
               <a:rPr lang="en-US" dirty="0"/>
               <a:pPr/>
-              <a:t>4/29/2019</a:t>
+              <a:t>4/30/2019</a:t>
             </a:fld>
             <a:endParaRPr lang="en-US" dirty="0"/>
           </a:p>
@@ -5021,7 +5074,7 @@
             <a:fld id="{D57F1E4F-1CFF-5643-939E-217C01CDF565}" type="slidenum">
               <a:rPr lang="en-US" dirty="0"/>
               <a:pPr/>
-              <a:t>‹Nr.›</a:t>
+              <a:t>‹#›</a:t>
             </a:fld>
             <a:endParaRPr lang="en-US" dirty="0"/>
           </a:p>
@@ -5577,6 +5630,504 @@
 </p:sld>
 </file>
 
+<file path=ppt/slides/slide10.xml><?xml version="1.0" encoding="utf-8"?>
+<p:sld xmlns:a="http://schemas.openxmlformats.org/drawingml/2006/main" xmlns:r="http://schemas.openxmlformats.org/officeDocument/2006/relationships" xmlns:p="http://schemas.openxmlformats.org/presentationml/2006/main">
+  <p:cSld>
+    <p:spTree>
+      <p:nvGrpSpPr>
+        <p:cNvPr id="1" name=""/>
+        <p:cNvGrpSpPr/>
+        <p:nvPr/>
+      </p:nvGrpSpPr>
+      <p:grpSpPr>
+        <a:xfrm>
+          <a:off x="0" y="0"/>
+          <a:ext cx="0" cy="0"/>
+          <a:chOff x="0" y="0"/>
+          <a:chExt cx="0" cy="0"/>
+        </a:xfrm>
+      </p:grpSpPr>
+      <p:sp>
+        <p:nvSpPr>
+          <p:cNvPr id="2" name="Title 1">
+            <a:extLst>
+              <a:ext uri="{FF2B5EF4-FFF2-40B4-BE49-F238E27FC236}">
+                <a16:creationId xmlns:a16="http://schemas.microsoft.com/office/drawing/2014/main" id="{E9EB5875-F86B-4D1E-8E3E-E3784360ACAF}"/>
+              </a:ext>
+            </a:extLst>
+          </p:cNvPr>
+          <p:cNvSpPr>
+            <a:spLocks noGrp="1"/>
+          </p:cNvSpPr>
+          <p:nvPr>
+            <p:ph type="title"/>
+          </p:nvPr>
+        </p:nvSpPr>
+        <p:spPr/>
+        <p:txBody>
+          <a:bodyPr/>
+          <a:lstStyle/>
+          <a:p>
+            <a:r>
+              <a:rPr lang="de-DE" dirty="0"/>
+              <a:t>Abläufe</a:t>
+            </a:r>
+          </a:p>
+        </p:txBody>
+      </p:sp>
+      <p:sp>
+        <p:nvSpPr>
+          <p:cNvPr id="3" name="Text Placeholder 2">
+            <a:extLst>
+              <a:ext uri="{FF2B5EF4-FFF2-40B4-BE49-F238E27FC236}">
+                <a16:creationId xmlns:a16="http://schemas.microsoft.com/office/drawing/2014/main" id="{EEC5B696-6980-4C06-A986-1E48597DF211}"/>
+              </a:ext>
+            </a:extLst>
+          </p:cNvPr>
+          <p:cNvSpPr>
+            <a:spLocks noGrp="1"/>
+          </p:cNvSpPr>
+          <p:nvPr>
+            <p:ph type="body" idx="1"/>
+          </p:nvPr>
+        </p:nvSpPr>
+        <p:spPr/>
+        <p:txBody>
+          <a:bodyPr/>
+          <a:lstStyle/>
+          <a:p>
+            <a:endParaRPr lang="de-DE"/>
+          </a:p>
+        </p:txBody>
+      </p:sp>
+    </p:spTree>
+    <p:extLst>
+      <p:ext uri="{BB962C8B-B14F-4D97-AF65-F5344CB8AC3E}">
+        <p14:creationId xmlns:p14="http://schemas.microsoft.com/office/powerpoint/2010/main" val="1020318277"/>
+      </p:ext>
+    </p:extLst>
+  </p:cSld>
+  <p:clrMapOvr>
+    <a:masterClrMapping/>
+  </p:clrMapOvr>
+</p:sld>
+</file>
+
+<file path=ppt/slides/slide11.xml><?xml version="1.0" encoding="utf-8"?>
+<p:sld xmlns:a="http://schemas.openxmlformats.org/drawingml/2006/main" xmlns:r="http://schemas.openxmlformats.org/officeDocument/2006/relationships" xmlns:p="http://schemas.openxmlformats.org/presentationml/2006/main">
+  <p:cSld>
+    <p:spTree>
+      <p:nvGrpSpPr>
+        <p:cNvPr id="1" name=""/>
+        <p:cNvGrpSpPr/>
+        <p:nvPr/>
+      </p:nvGrpSpPr>
+      <p:grpSpPr>
+        <a:xfrm>
+          <a:off x="0" y="0"/>
+          <a:ext cx="0" cy="0"/>
+          <a:chOff x="0" y="0"/>
+          <a:chExt cx="0" cy="0"/>
+        </a:xfrm>
+      </p:grpSpPr>
+      <p:sp>
+        <p:nvSpPr>
+          <p:cNvPr id="2" name="Title 1">
+            <a:extLst>
+              <a:ext uri="{FF2B5EF4-FFF2-40B4-BE49-F238E27FC236}">
+                <a16:creationId xmlns:a16="http://schemas.microsoft.com/office/drawing/2014/main" id="{F75A3D9C-0C7A-43DF-99EB-A8C063B3C172}"/>
+              </a:ext>
+            </a:extLst>
+          </p:cNvPr>
+          <p:cNvSpPr>
+            <a:spLocks noGrp="1"/>
+          </p:cNvSpPr>
+          <p:nvPr>
+            <p:ph type="title"/>
+          </p:nvPr>
+        </p:nvSpPr>
+        <p:spPr/>
+        <p:txBody>
+          <a:bodyPr/>
+          <a:lstStyle/>
+          <a:p>
+            <a:r>
+              <a:rPr lang="de-DE" dirty="0"/>
+              <a:t>Regeln</a:t>
+            </a:r>
+          </a:p>
+        </p:txBody>
+      </p:sp>
+      <p:sp>
+        <p:nvSpPr>
+          <p:cNvPr id="4" name="Text Placeholder 3">
+            <a:extLst>
+              <a:ext uri="{FF2B5EF4-FFF2-40B4-BE49-F238E27FC236}">
+                <a16:creationId xmlns:a16="http://schemas.microsoft.com/office/drawing/2014/main" id="{C9F72C86-7D50-40ED-9472-33A84BAFE548}"/>
+              </a:ext>
+            </a:extLst>
+          </p:cNvPr>
+          <p:cNvSpPr>
+            <a:spLocks noGrp="1"/>
+          </p:cNvSpPr>
+          <p:nvPr>
+            <p:ph type="body" idx="1"/>
+          </p:nvPr>
+        </p:nvSpPr>
+        <p:spPr/>
+        <p:txBody>
+          <a:bodyPr/>
+          <a:lstStyle/>
+          <a:p>
+            <a:endParaRPr lang="de-DE"/>
+          </a:p>
+        </p:txBody>
+      </p:sp>
+    </p:spTree>
+    <p:extLst>
+      <p:ext uri="{BB962C8B-B14F-4D97-AF65-F5344CB8AC3E}">
+        <p14:creationId xmlns:p14="http://schemas.microsoft.com/office/powerpoint/2010/main" val="3186779876"/>
+      </p:ext>
+    </p:extLst>
+  </p:cSld>
+  <p:clrMapOvr>
+    <a:masterClrMapping/>
+  </p:clrMapOvr>
+</p:sld>
+</file>
+
+<file path=ppt/slides/slide12.xml><?xml version="1.0" encoding="utf-8"?>
+<p:sld xmlns:a="http://schemas.openxmlformats.org/drawingml/2006/main" xmlns:r="http://schemas.openxmlformats.org/officeDocument/2006/relationships" xmlns:p="http://schemas.openxmlformats.org/presentationml/2006/main">
+  <p:cSld>
+    <p:spTree>
+      <p:nvGrpSpPr>
+        <p:cNvPr id="1" name=""/>
+        <p:cNvGrpSpPr/>
+        <p:nvPr/>
+      </p:nvGrpSpPr>
+      <p:grpSpPr>
+        <a:xfrm>
+          <a:off x="0" y="0"/>
+          <a:ext cx="0" cy="0"/>
+          <a:chOff x="0" y="0"/>
+          <a:chExt cx="0" cy="0"/>
+        </a:xfrm>
+      </p:grpSpPr>
+      <p:sp>
+        <p:nvSpPr>
+          <p:cNvPr id="2" name="Title 1">
+            <a:extLst>
+              <a:ext uri="{FF2B5EF4-FFF2-40B4-BE49-F238E27FC236}">
+                <a16:creationId xmlns:a16="http://schemas.microsoft.com/office/drawing/2014/main" id="{EF02E3B6-7728-409B-AA2F-6C156B0FA560}"/>
+              </a:ext>
+            </a:extLst>
+          </p:cNvPr>
+          <p:cNvSpPr>
+            <a:spLocks noGrp="1"/>
+          </p:cNvSpPr>
+          <p:nvPr>
+            <p:ph type="title"/>
+          </p:nvPr>
+        </p:nvSpPr>
+        <p:spPr/>
+        <p:txBody>
+          <a:bodyPr/>
+          <a:lstStyle/>
+          <a:p>
+            <a:r>
+              <a:rPr lang="de-DE" dirty="0"/>
+              <a:t>Ressourcen</a:t>
+            </a:r>
+          </a:p>
+        </p:txBody>
+      </p:sp>
+      <p:sp>
+        <p:nvSpPr>
+          <p:cNvPr id="4" name="Text Placeholder 3">
+            <a:extLst>
+              <a:ext uri="{FF2B5EF4-FFF2-40B4-BE49-F238E27FC236}">
+                <a16:creationId xmlns:a16="http://schemas.microsoft.com/office/drawing/2014/main" id="{5D2288A5-B0AC-4C1C-B6B2-1D4694396011}"/>
+              </a:ext>
+            </a:extLst>
+          </p:cNvPr>
+          <p:cNvSpPr>
+            <a:spLocks noGrp="1"/>
+          </p:cNvSpPr>
+          <p:nvPr>
+            <p:ph type="body" idx="1"/>
+          </p:nvPr>
+        </p:nvSpPr>
+        <p:spPr/>
+        <p:txBody>
+          <a:bodyPr/>
+          <a:lstStyle/>
+          <a:p>
+            <a:endParaRPr lang="de-DE"/>
+          </a:p>
+        </p:txBody>
+      </p:sp>
+    </p:spTree>
+    <p:extLst>
+      <p:ext uri="{BB962C8B-B14F-4D97-AF65-F5344CB8AC3E}">
+        <p14:creationId xmlns:p14="http://schemas.microsoft.com/office/powerpoint/2010/main" val="3851938191"/>
+      </p:ext>
+    </p:extLst>
+  </p:cSld>
+  <p:clrMapOvr>
+    <a:masterClrMapping/>
+  </p:clrMapOvr>
+</p:sld>
+</file>
+
+<file path=ppt/slides/slide13.xml><?xml version="1.0" encoding="utf-8"?>
+<p:sld xmlns:a="http://schemas.openxmlformats.org/drawingml/2006/main" xmlns:r="http://schemas.openxmlformats.org/officeDocument/2006/relationships" xmlns:p="http://schemas.openxmlformats.org/presentationml/2006/main">
+  <p:cSld>
+    <p:spTree>
+      <p:nvGrpSpPr>
+        <p:cNvPr id="1" name=""/>
+        <p:cNvGrpSpPr/>
+        <p:nvPr/>
+      </p:nvGrpSpPr>
+      <p:grpSpPr>
+        <a:xfrm>
+          <a:off x="0" y="0"/>
+          <a:ext cx="0" cy="0"/>
+          <a:chOff x="0" y="0"/>
+          <a:chExt cx="0" cy="0"/>
+        </a:xfrm>
+      </p:grpSpPr>
+      <p:sp>
+        <p:nvSpPr>
+          <p:cNvPr id="2" name="Title 1">
+            <a:extLst>
+              <a:ext uri="{FF2B5EF4-FFF2-40B4-BE49-F238E27FC236}">
+                <a16:creationId xmlns:a16="http://schemas.microsoft.com/office/drawing/2014/main" id="{E2FC36D9-4836-4C7F-B17D-330362EAA4FC}"/>
+              </a:ext>
+            </a:extLst>
+          </p:cNvPr>
+          <p:cNvSpPr>
+            <a:spLocks noGrp="1"/>
+          </p:cNvSpPr>
+          <p:nvPr>
+            <p:ph type="title"/>
+          </p:nvPr>
+        </p:nvSpPr>
+        <p:spPr/>
+        <p:txBody>
+          <a:bodyPr/>
+          <a:lstStyle/>
+          <a:p>
+            <a:r>
+              <a:rPr lang="de-DE" dirty="0"/>
+              <a:t>Konflikte &amp; absehbare Schwierigkeiten</a:t>
+            </a:r>
+          </a:p>
+        </p:txBody>
+      </p:sp>
+      <p:sp>
+        <p:nvSpPr>
+          <p:cNvPr id="4" name="Text Placeholder 3">
+            <a:extLst>
+              <a:ext uri="{FF2B5EF4-FFF2-40B4-BE49-F238E27FC236}">
+                <a16:creationId xmlns:a16="http://schemas.microsoft.com/office/drawing/2014/main" id="{E2A16828-BD38-4201-AFA8-DE45322A084F}"/>
+              </a:ext>
+            </a:extLst>
+          </p:cNvPr>
+          <p:cNvSpPr>
+            <a:spLocks noGrp="1"/>
+          </p:cNvSpPr>
+          <p:nvPr>
+            <p:ph type="body" idx="1"/>
+          </p:nvPr>
+        </p:nvSpPr>
+        <p:spPr/>
+        <p:txBody>
+          <a:bodyPr/>
+          <a:lstStyle/>
+          <a:p>
+            <a:endParaRPr lang="de-DE"/>
+          </a:p>
+        </p:txBody>
+      </p:sp>
+    </p:spTree>
+    <p:extLst>
+      <p:ext uri="{BB962C8B-B14F-4D97-AF65-F5344CB8AC3E}">
+        <p14:creationId xmlns:p14="http://schemas.microsoft.com/office/powerpoint/2010/main" val="727512892"/>
+      </p:ext>
+    </p:extLst>
+  </p:cSld>
+  <p:clrMapOvr>
+    <a:masterClrMapping/>
+  </p:clrMapOvr>
+</p:sld>
+</file>
+
+<file path=ppt/slides/slide14.xml><?xml version="1.0" encoding="utf-8"?>
+<p:sld xmlns:a="http://schemas.openxmlformats.org/drawingml/2006/main" xmlns:r="http://schemas.openxmlformats.org/officeDocument/2006/relationships" xmlns:p="http://schemas.openxmlformats.org/presentationml/2006/main">
+  <p:cSld>
+    <p:spTree>
+      <p:nvGrpSpPr>
+        <p:cNvPr id="1" name=""/>
+        <p:cNvGrpSpPr/>
+        <p:nvPr/>
+      </p:nvGrpSpPr>
+      <p:grpSpPr>
+        <a:xfrm>
+          <a:off x="0" y="0"/>
+          <a:ext cx="0" cy="0"/>
+          <a:chOff x="0" y="0"/>
+          <a:chExt cx="0" cy="0"/>
+        </a:xfrm>
+      </p:grpSpPr>
+      <p:sp>
+        <p:nvSpPr>
+          <p:cNvPr id="2" name="Title 1">
+            <a:extLst>
+              <a:ext uri="{FF2B5EF4-FFF2-40B4-BE49-F238E27FC236}">
+                <a16:creationId xmlns:a16="http://schemas.microsoft.com/office/drawing/2014/main" id="{A4068062-1FBB-481E-8A2D-DDC9C5F15684}"/>
+              </a:ext>
+            </a:extLst>
+          </p:cNvPr>
+          <p:cNvSpPr>
+            <a:spLocks noGrp="1"/>
+          </p:cNvSpPr>
+          <p:nvPr>
+            <p:ph type="title"/>
+          </p:nvPr>
+        </p:nvSpPr>
+        <p:spPr/>
+        <p:txBody>
+          <a:bodyPr/>
+          <a:lstStyle/>
+          <a:p>
+            <a:r>
+              <a:rPr lang="de-DE" dirty="0"/>
+              <a:t>Rahmenbedingungen</a:t>
+            </a:r>
+          </a:p>
+        </p:txBody>
+      </p:sp>
+      <p:sp>
+        <p:nvSpPr>
+          <p:cNvPr id="4" name="Text Placeholder 3">
+            <a:extLst>
+              <a:ext uri="{FF2B5EF4-FFF2-40B4-BE49-F238E27FC236}">
+                <a16:creationId xmlns:a16="http://schemas.microsoft.com/office/drawing/2014/main" id="{77C20D7E-2C45-4B3D-AB55-23BD7017A865}"/>
+              </a:ext>
+            </a:extLst>
+          </p:cNvPr>
+          <p:cNvSpPr>
+            <a:spLocks noGrp="1"/>
+          </p:cNvSpPr>
+          <p:nvPr>
+            <p:ph type="body" idx="1"/>
+          </p:nvPr>
+        </p:nvSpPr>
+        <p:spPr/>
+        <p:txBody>
+          <a:bodyPr/>
+          <a:lstStyle/>
+          <a:p>
+            <a:endParaRPr lang="de-DE"/>
+          </a:p>
+        </p:txBody>
+      </p:sp>
+    </p:spTree>
+    <p:extLst>
+      <p:ext uri="{BB962C8B-B14F-4D97-AF65-F5344CB8AC3E}">
+        <p14:creationId xmlns:p14="http://schemas.microsoft.com/office/powerpoint/2010/main" val="2995921652"/>
+      </p:ext>
+    </p:extLst>
+  </p:cSld>
+  <p:clrMapOvr>
+    <a:masterClrMapping/>
+  </p:clrMapOvr>
+</p:sld>
+</file>
+
+<file path=ppt/slides/slide15.xml><?xml version="1.0" encoding="utf-8"?>
+<p:sld xmlns:a="http://schemas.openxmlformats.org/drawingml/2006/main" xmlns:r="http://schemas.openxmlformats.org/officeDocument/2006/relationships" xmlns:p="http://schemas.openxmlformats.org/presentationml/2006/main">
+  <p:cSld>
+    <p:spTree>
+      <p:nvGrpSpPr>
+        <p:cNvPr id="1" name=""/>
+        <p:cNvGrpSpPr/>
+        <p:nvPr/>
+      </p:nvGrpSpPr>
+      <p:grpSpPr>
+        <a:xfrm>
+          <a:off x="0" y="0"/>
+          <a:ext cx="0" cy="0"/>
+          <a:chOff x="0" y="0"/>
+          <a:chExt cx="0" cy="0"/>
+        </a:xfrm>
+      </p:grpSpPr>
+      <p:sp>
+        <p:nvSpPr>
+          <p:cNvPr id="2" name="Title 1">
+            <a:extLst>
+              <a:ext uri="{FF2B5EF4-FFF2-40B4-BE49-F238E27FC236}">
+                <a16:creationId xmlns:a16="http://schemas.microsoft.com/office/drawing/2014/main" id="{663570ED-9D61-46D3-906D-9C71BEF067B6}"/>
+              </a:ext>
+            </a:extLst>
+          </p:cNvPr>
+          <p:cNvSpPr>
+            <a:spLocks noGrp="1"/>
+          </p:cNvSpPr>
+          <p:nvPr>
+            <p:ph type="title"/>
+          </p:nvPr>
+        </p:nvSpPr>
+        <p:spPr/>
+        <p:txBody>
+          <a:bodyPr/>
+          <a:lstStyle/>
+          <a:p>
+            <a:r>
+              <a:rPr lang="de-DE" dirty="0"/>
+              <a:t>Ergebnisse</a:t>
+            </a:r>
+          </a:p>
+        </p:txBody>
+      </p:sp>
+      <p:sp>
+        <p:nvSpPr>
+          <p:cNvPr id="4" name="Text Placeholder 3">
+            <a:extLst>
+              <a:ext uri="{FF2B5EF4-FFF2-40B4-BE49-F238E27FC236}">
+                <a16:creationId xmlns:a16="http://schemas.microsoft.com/office/drawing/2014/main" id="{C913C932-11BD-46C0-86DB-07A2A8DC10A6}"/>
+              </a:ext>
+            </a:extLst>
+          </p:cNvPr>
+          <p:cNvSpPr>
+            <a:spLocks noGrp="1"/>
+          </p:cNvSpPr>
+          <p:nvPr>
+            <p:ph type="body" idx="1"/>
+          </p:nvPr>
+        </p:nvSpPr>
+        <p:spPr/>
+        <p:txBody>
+          <a:bodyPr/>
+          <a:lstStyle/>
+          <a:p>
+            <a:endParaRPr lang="de-DE"/>
+          </a:p>
+        </p:txBody>
+      </p:sp>
+    </p:spTree>
+    <p:extLst>
+      <p:ext uri="{BB962C8B-B14F-4D97-AF65-F5344CB8AC3E}">
+        <p14:creationId xmlns:p14="http://schemas.microsoft.com/office/powerpoint/2010/main" val="3970480316"/>
+      </p:ext>
+    </p:extLst>
+  </p:cSld>
+  <p:clrMapOvr>
+    <a:masterClrMapping/>
+  </p:clrMapOvr>
+</p:sld>
+</file>
+
 <file path=ppt/slides/slide2.xml><?xml version="1.0" encoding="utf-8"?>
 <p:sld xmlns:a="http://schemas.openxmlformats.org/drawingml/2006/main" xmlns:r="http://schemas.openxmlformats.org/officeDocument/2006/relationships" xmlns:p="http://schemas.openxmlformats.org/presentationml/2006/main">
   <p:cSld>
@@ -5658,6 +6209,9 @@
   <p:clrMapOvr>
     <a:masterClrMapping/>
   </p:clrMapOvr>
+  <p:transition spd="slow">
+    <p:push/>
+  </p:transition>
 </p:sld>
 </file>
 
@@ -5680,10 +6234,10 @@
       </p:grpSpPr>
       <p:sp>
         <p:nvSpPr>
-          <p:cNvPr id="2" name="Titel 1">
+          <p:cNvPr id="2" name="Title 1">
             <a:extLst>
               <a:ext uri="{FF2B5EF4-FFF2-40B4-BE49-F238E27FC236}">
-                <a16:creationId xmlns:a16="http://schemas.microsoft.com/office/drawing/2014/main" id="{E9F16637-3D51-4D20-BE18-102B6997BDE7}"/>
+                <a16:creationId xmlns:a16="http://schemas.microsoft.com/office/drawing/2014/main" id="{2571A1A1-9A44-42A6-A02B-76C094C9F7C7}"/>
               </a:ext>
             </a:extLst>
           </p:cNvPr>
@@ -5711,10 +6265,10 @@
         <mc:Choice xmlns:psuz="http://schemas.microsoft.com/office/powerpoint/2016/summaryzoom" Requires="psuz">
           <p:graphicFrame>
             <p:nvGraphicFramePr>
-              <p:cNvPr id="5" name="Zusammenfassungszoom 4">
+              <p:cNvPr id="5" name="Summary Zoom 4">
                 <a:extLst>
                   <a:ext uri="{FF2B5EF4-FFF2-40B4-BE49-F238E27FC236}">
-                    <a16:creationId xmlns:a16="http://schemas.microsoft.com/office/drawing/2014/main" id="{CF34D09C-D5A2-4634-BB68-B0364D0DA7E4}"/>
+                    <a16:creationId xmlns:a16="http://schemas.microsoft.com/office/drawing/2014/main" id="{2D9DB9DC-0B98-423B-B90F-A36EE18FBE1C}"/>
                   </a:ext>
                 </a:extLst>
               </p:cNvPr>
@@ -5724,7 +6278,7 @@
               <p:nvPr>
                 <p:extLst>
                   <p:ext uri="{D42A27DB-BD31-4B8C-83A1-F6EECF244321}">
-                    <p14:modId xmlns:p14="http://schemas.microsoft.com/office/powerpoint/2010/main" val="3405484523"/>
+                    <p14:modId xmlns:p14="http://schemas.microsoft.com/office/powerpoint/2010/main" val="2844971571"/>
                   </p:ext>
                 </p:extLst>
               </p:nvPr>
@@ -5737,7 +6291,7 @@
               <a:graphicData uri="http://schemas.microsoft.com/office/powerpoint/2016/summaryzoom">
                 <psuz:summaryZm>
                   <psuz:summaryZmObj sectionId="{448C54FB-7A7F-4DE3-931A-5B530A9D04AF}">
-                    <psuz:zmPr id="{7105F29A-EFE2-4F87-B248-A79B91611AEF}" transitionDur="1000">
+                    <psuz:zmPr id="{F8C3ECE4-F35D-4DEF-9D8D-A3E4233DAC5D}" transitionDur="1000">
                       <p166:blipFill xmlns:p166="http://schemas.microsoft.com/office/powerpoint/2016/6/main">
                         <a:blip r:embed="rId2"/>
                         <a:stretch>
@@ -5761,7 +6315,7 @@
                     </psuz:zmPr>
                   </psuz:summaryZmObj>
                   <psuz:summaryZmObj sectionId="{0A0AD3E9-F226-499F-A6A9-475BBDC8260B}">
-                    <psuz:zmPr id="{52323606-4A8D-4887-BB96-2A74407C64F8}" transitionDur="1000">
+                    <psuz:zmPr id="{E6B11968-320D-4A08-9487-32EAF7BF4BC7}" transitionDur="1000">
                       <p166:blipFill xmlns:p166="http://schemas.microsoft.com/office/powerpoint/2016/6/main">
                         <a:blip r:embed="rId3"/>
                         <a:stretch>
@@ -5793,10 +6347,10 @@
         <mc:Fallback>
           <p:grpSp>
             <p:nvGrpSpPr>
-              <p:cNvPr id="5" name="Zusammenfassungszoom 4">
+              <p:cNvPr id="5" name="Summary Zoom 4">
                 <a:extLst>
                   <a:ext uri="{FF2B5EF4-FFF2-40B4-BE49-F238E27FC236}">
-                    <a16:creationId xmlns:a16="http://schemas.microsoft.com/office/drawing/2014/main" id="{CF34D09C-D5A2-4634-BB68-B0364D0DA7E4}"/>
+                    <a16:creationId xmlns:a16="http://schemas.microsoft.com/office/drawing/2014/main" id="{2D9DB9DC-0B98-423B-B90F-A36EE18FBE1C}"/>
                   </a:ext>
                 </a:extLst>
               </p:cNvPr>
@@ -5815,7 +6369,7 @@
             </p:grpSpPr>
             <p:pic>
               <p:nvPicPr>
-                <p:cNvPr id="6" name="Grafik 6">
+                <p:cNvPr id="6" name="Picture 6">
                   <a:hlinkClick r:id="rId4" action="ppaction://hlinksldjump"/>
                 </p:cNvPr>
                 <p:cNvPicPr>
@@ -5846,7 +6400,7 @@
             </p:pic>
             <p:pic>
               <p:nvPicPr>
-                <p:cNvPr id="7" name="Grafik 7">
+                <p:cNvPr id="7" name="Picture 7">
                   <a:hlinkClick r:id="rId5" action="ppaction://hlinksldjump"/>
                 </p:cNvPr>
                 <p:cNvPicPr>
@@ -5881,13 +6435,25 @@
     </p:spTree>
     <p:extLst>
       <p:ext uri="{BB962C8B-B14F-4D97-AF65-F5344CB8AC3E}">
-        <p14:creationId xmlns:p14="http://schemas.microsoft.com/office/powerpoint/2010/main" val="271697950"/>
+        <p14:creationId xmlns:p14="http://schemas.microsoft.com/office/powerpoint/2010/main" val="3458338609"/>
       </p:ext>
     </p:extLst>
   </p:cSld>
   <p:clrMapOvr>
     <a:masterClrMapping/>
   </p:clrMapOvr>
+  <mc:AlternateContent xmlns:mc="http://schemas.openxmlformats.org/markup-compatibility/2006">
+    <mc:Choice xmlns:p14="http://schemas.microsoft.com/office/powerpoint/2010/main" Requires="p14">
+      <p:transition spd="slow" p14:dur="1250">
+        <p14:switch dir="r"/>
+      </p:transition>
+    </mc:Choice>
+    <mc:Fallback>
+      <p:transition spd="slow">
+        <p:fade/>
+      </p:transition>
+    </mc:Fallback>
+  </mc:AlternateContent>
 </p:sld>
 </file>
 
@@ -6310,7 +6876,7 @@
           <a:lstStyle/>
           <a:p>
             <a:r>
-              <a:rPr lang="de-DE">
+              <a:rPr lang="de-DE" dirty="0">
                 <a:solidFill>
                   <a:schemeClr val="tx1"/>
                 </a:solidFill>
@@ -6546,6 +7112,9 @@
   <p:clrMapOvr>
     <a:masterClrMapping/>
   </p:clrMapOvr>
+  <p:transition spd="slow">
+    <p:push dir="u"/>
+  </p:transition>
 </p:sld>
 </file>
 
@@ -6657,6 +7226,743 @@
     <p:extLst>
       <p:ext uri="{BB962C8B-B14F-4D97-AF65-F5344CB8AC3E}">
         <p14:creationId xmlns:p14="http://schemas.microsoft.com/office/powerpoint/2010/main" val="419410755"/>
+      </p:ext>
+    </p:extLst>
+  </p:cSld>
+  <p:clrMapOvr>
+    <a:masterClrMapping/>
+  </p:clrMapOvr>
+</p:sld>
+</file>
+
+<file path=ppt/slides/slide7.xml><?xml version="1.0" encoding="utf-8"?>
+<p:sld xmlns:a="http://schemas.openxmlformats.org/drawingml/2006/main" xmlns:r="http://schemas.openxmlformats.org/officeDocument/2006/relationships" xmlns:p="http://schemas.openxmlformats.org/presentationml/2006/main">
+  <p:cSld>
+    <p:spTree>
+      <p:nvGrpSpPr>
+        <p:cNvPr id="1" name=""/>
+        <p:cNvGrpSpPr/>
+        <p:nvPr/>
+      </p:nvGrpSpPr>
+      <p:grpSpPr>
+        <a:xfrm>
+          <a:off x="0" y="0"/>
+          <a:ext cx="0" cy="0"/>
+          <a:chOff x="0" y="0"/>
+          <a:chExt cx="0" cy="0"/>
+        </a:xfrm>
+      </p:grpSpPr>
+      <p:sp>
+        <p:nvSpPr>
+          <p:cNvPr id="2" name="Title 1">
+            <a:extLst>
+              <a:ext uri="{FF2B5EF4-FFF2-40B4-BE49-F238E27FC236}">
+                <a16:creationId xmlns:a16="http://schemas.microsoft.com/office/drawing/2014/main" id="{A563ED78-99F3-4906-A9D6-FE286538616F}"/>
+              </a:ext>
+            </a:extLst>
+          </p:cNvPr>
+          <p:cNvSpPr>
+            <a:spLocks noGrp="1"/>
+          </p:cNvSpPr>
+          <p:nvPr>
+            <p:ph type="title"/>
+          </p:nvPr>
+        </p:nvSpPr>
+        <p:spPr/>
+        <p:txBody>
+          <a:bodyPr/>
+          <a:lstStyle/>
+          <a:p>
+            <a:r>
+              <a:rPr lang="de-DE" dirty="0"/>
+              <a:t>Formale Elemente</a:t>
+            </a:r>
+          </a:p>
+        </p:txBody>
+      </p:sp>
+      <mc:AlternateContent xmlns:mc="http://schemas.openxmlformats.org/markup-compatibility/2006">
+        <mc:Choice xmlns:psuz="http://schemas.microsoft.com/office/powerpoint/2016/summaryzoom" Requires="psuz">
+          <p:graphicFrame>
+            <p:nvGraphicFramePr>
+              <p:cNvPr id="5" name="Summary Zoom 4">
+                <a:extLst>
+                  <a:ext uri="{FF2B5EF4-FFF2-40B4-BE49-F238E27FC236}">
+                    <a16:creationId xmlns:a16="http://schemas.microsoft.com/office/drawing/2014/main" id="{BBC55DF4-539B-4AF5-8FBA-E437AACE296C}"/>
+                  </a:ext>
+                </a:extLst>
+              </p:cNvPr>
+              <p:cNvGraphicFramePr>
+                <a:graphicFrameLocks noChangeAspect="1"/>
+              </p:cNvGraphicFramePr>
+              <p:nvPr>
+                <p:extLst>
+                  <p:ext uri="{D42A27DB-BD31-4B8C-83A1-F6EECF244321}">
+                    <p14:modId xmlns:p14="http://schemas.microsoft.com/office/powerpoint/2010/main" val="2324272120"/>
+                  </p:ext>
+                </p:extLst>
+              </p:nvPr>
+            </p:nvGraphicFramePr>
+            <p:xfrm>
+              <a:off x="819150" y="2222500"/>
+              <a:ext cx="10553700" cy="3636963"/>
+            </p:xfrm>
+            <a:graphic>
+              <a:graphicData uri="http://schemas.microsoft.com/office/powerpoint/2016/summaryzoom">
+                <psuz:summaryZm>
+                  <psuz:summaryZmObj sectionId="{2D74ECE9-51AA-48B2-A681-1B700657B38C}">
+                    <psuz:zmPr id="{06DE6D10-687B-4F09-8352-C14629A5F1F3}" transitionDur="750">
+                      <p166:blipFill xmlns:p166="http://schemas.microsoft.com/office/powerpoint/2016/6/main">
+                        <a:blip r:embed="rId2"/>
+                        <a:stretch>
+                          <a:fillRect/>
+                        </a:stretch>
+                      </p166:blipFill>
+                      <p166:spPr xmlns:p166="http://schemas.microsoft.com/office/powerpoint/2016/6/main">
+                        <a:xfrm>
+                          <a:off x="394113" y="438255"/>
+                          <a:ext cx="2374583" cy="1335703"/>
+                        </a:xfrm>
+                        <a:prstGeom prst="rect">
+                          <a:avLst/>
+                        </a:prstGeom>
+                        <a:ln w="3175">
+                          <a:solidFill>
+                            <a:prstClr val="ltGray"/>
+                          </a:solidFill>
+                        </a:ln>
+                      </p166:spPr>
+                    </psuz:zmPr>
+                  </psuz:summaryZmObj>
+                  <psuz:summaryZmObj sectionId="{3416F951-5A24-405D-9DA1-EF4A54895E36}">
+                    <psuz:zmPr id="{1EFBE078-C436-4F3E-AA79-D5275EC12078}" transitionDur="750">
+                      <p166:blipFill xmlns:p166="http://schemas.microsoft.com/office/powerpoint/2016/6/main">
+                        <a:blip r:embed="rId3"/>
+                        <a:stretch>
+                          <a:fillRect/>
+                        </a:stretch>
+                      </p166:blipFill>
+                      <p166:spPr xmlns:p166="http://schemas.microsoft.com/office/powerpoint/2016/6/main">
+                        <a:xfrm>
+                          <a:off x="2857743" y="438255"/>
+                          <a:ext cx="2374583" cy="1335703"/>
+                        </a:xfrm>
+                        <a:prstGeom prst="rect">
+                          <a:avLst/>
+                        </a:prstGeom>
+                        <a:ln w="3175">
+                          <a:solidFill>
+                            <a:prstClr val="ltGray"/>
+                          </a:solidFill>
+                        </a:ln>
+                      </p166:spPr>
+                    </psuz:zmPr>
+                  </psuz:summaryZmObj>
+                  <psuz:summaryZmObj sectionId="{FBA0BB86-F06D-4BA0-983B-4B94ED8FA917}">
+                    <psuz:zmPr id="{F6FC9AAC-A520-493A-B66F-55BD6F5DD7D2}" transitionDur="750">
+                      <p166:blipFill xmlns:p166="http://schemas.microsoft.com/office/powerpoint/2016/6/main">
+                        <a:blip r:embed="rId4"/>
+                        <a:stretch>
+                          <a:fillRect/>
+                        </a:stretch>
+                      </p166:blipFill>
+                      <p166:spPr xmlns:p166="http://schemas.microsoft.com/office/powerpoint/2016/6/main">
+                        <a:xfrm>
+                          <a:off x="5321373" y="438255"/>
+                          <a:ext cx="2374583" cy="1335703"/>
+                        </a:xfrm>
+                        <a:prstGeom prst="rect">
+                          <a:avLst/>
+                        </a:prstGeom>
+                        <a:ln w="3175">
+                          <a:solidFill>
+                            <a:prstClr val="ltGray"/>
+                          </a:solidFill>
+                        </a:ln>
+                      </p166:spPr>
+                    </psuz:zmPr>
+                  </psuz:summaryZmObj>
+                  <psuz:summaryZmObj sectionId="{4EAB2BE6-6483-4DE4-B885-F8A04D3A5DC6}">
+                    <psuz:zmPr id="{25F8A6D4-A9EA-4039-8799-95F10AF5503E}" transitionDur="750">
+                      <p166:blipFill xmlns:p166="http://schemas.microsoft.com/office/powerpoint/2016/6/main">
+                        <a:blip r:embed="rId5"/>
+                        <a:stretch>
+                          <a:fillRect/>
+                        </a:stretch>
+                      </p166:blipFill>
+                      <p166:spPr xmlns:p166="http://schemas.microsoft.com/office/powerpoint/2016/6/main">
+                        <a:xfrm>
+                          <a:off x="7785003" y="438255"/>
+                          <a:ext cx="2374583" cy="1335703"/>
+                        </a:xfrm>
+                        <a:prstGeom prst="rect">
+                          <a:avLst/>
+                        </a:prstGeom>
+                        <a:ln w="3175">
+                          <a:solidFill>
+                            <a:prstClr val="ltGray"/>
+                          </a:solidFill>
+                        </a:ln>
+                      </p166:spPr>
+                    </psuz:zmPr>
+                  </psuz:summaryZmObj>
+                  <psuz:summaryZmObj sectionId="{F5254605-6156-463A-9D1F-716FC09734B6}">
+                    <psuz:zmPr id="{A0DD51D3-925D-479B-82D7-00B36972AE87}" transitionDur="750">
+                      <p166:blipFill xmlns:p166="http://schemas.microsoft.com/office/powerpoint/2016/6/main">
+                        <a:blip r:embed="rId6"/>
+                        <a:stretch>
+                          <a:fillRect/>
+                        </a:stretch>
+                      </p166:blipFill>
+                      <p166:spPr xmlns:p166="http://schemas.microsoft.com/office/powerpoint/2016/6/main">
+                        <a:xfrm>
+                          <a:off x="394113" y="1863005"/>
+                          <a:ext cx="2374583" cy="1335703"/>
+                        </a:xfrm>
+                        <a:prstGeom prst="rect">
+                          <a:avLst/>
+                        </a:prstGeom>
+                        <a:ln w="3175">
+                          <a:solidFill>
+                            <a:prstClr val="ltGray"/>
+                          </a:solidFill>
+                        </a:ln>
+                      </p166:spPr>
+                    </psuz:zmPr>
+                  </psuz:summaryZmObj>
+                  <psuz:summaryZmObj sectionId="{71526EA7-9B9A-4FE5-B037-5674774363E2}">
+                    <psuz:zmPr id="{80B394C7-C722-43E3-AA57-0C3B35FDAAF8}" transitionDur="750">
+                      <p166:blipFill xmlns:p166="http://schemas.microsoft.com/office/powerpoint/2016/6/main">
+                        <a:blip r:embed="rId7"/>
+                        <a:stretch>
+                          <a:fillRect/>
+                        </a:stretch>
+                      </p166:blipFill>
+                      <p166:spPr xmlns:p166="http://schemas.microsoft.com/office/powerpoint/2016/6/main">
+                        <a:xfrm>
+                          <a:off x="2857743" y="1863005"/>
+                          <a:ext cx="2374583" cy="1335703"/>
+                        </a:xfrm>
+                        <a:prstGeom prst="rect">
+                          <a:avLst/>
+                        </a:prstGeom>
+                        <a:ln w="3175">
+                          <a:solidFill>
+                            <a:prstClr val="ltGray"/>
+                          </a:solidFill>
+                        </a:ln>
+                      </p166:spPr>
+                    </psuz:zmPr>
+                  </psuz:summaryZmObj>
+                  <psuz:summaryZmObj sectionId="{D6A69A88-33A5-4091-A66E-533B9558B68E}">
+                    <psuz:zmPr id="{2EED2313-555E-4322-8C62-7462CDA7A256}" transitionDur="750">
+                      <p166:blipFill xmlns:p166="http://schemas.microsoft.com/office/powerpoint/2016/6/main">
+                        <a:blip r:embed="rId8"/>
+                        <a:stretch>
+                          <a:fillRect/>
+                        </a:stretch>
+                      </p166:blipFill>
+                      <p166:spPr xmlns:p166="http://schemas.microsoft.com/office/powerpoint/2016/6/main">
+                        <a:xfrm>
+                          <a:off x="5321373" y="1863005"/>
+                          <a:ext cx="2374583" cy="1335703"/>
+                        </a:xfrm>
+                        <a:prstGeom prst="rect">
+                          <a:avLst/>
+                        </a:prstGeom>
+                        <a:ln w="3175">
+                          <a:solidFill>
+                            <a:prstClr val="ltGray"/>
+                          </a:solidFill>
+                        </a:ln>
+                      </p166:spPr>
+                    </psuz:zmPr>
+                  </psuz:summaryZmObj>
+                  <psuz:summaryZmObj sectionId="{B62DC81D-7119-4DBA-A8F1-949B2D1686E3}">
+                    <psuz:zmPr id="{A5D6B46C-B6B3-42CE-99D8-E65BBB13A11B}" transitionDur="750">
+                      <p166:blipFill xmlns:p166="http://schemas.microsoft.com/office/powerpoint/2016/6/main">
+                        <a:blip r:embed="rId9"/>
+                        <a:stretch>
+                          <a:fillRect/>
+                        </a:stretch>
+                      </p166:blipFill>
+                      <p166:spPr xmlns:p166="http://schemas.microsoft.com/office/powerpoint/2016/6/main">
+                        <a:xfrm>
+                          <a:off x="7785003" y="1863005"/>
+                          <a:ext cx="2374583" cy="1335703"/>
+                        </a:xfrm>
+                        <a:prstGeom prst="rect">
+                          <a:avLst/>
+                        </a:prstGeom>
+                        <a:ln w="3175">
+                          <a:solidFill>
+                            <a:prstClr val="ltGray"/>
+                          </a:solidFill>
+                        </a:ln>
+                      </p166:spPr>
+                    </psuz:zmPr>
+                  </psuz:summaryZmObj>
+                  <psuz:gridLayout/>
+                </psuz:summaryZm>
+              </a:graphicData>
+            </a:graphic>
+          </p:graphicFrame>
+        </mc:Choice>
+        <mc:Fallback>
+          <p:grpSp>
+            <p:nvGrpSpPr>
+              <p:cNvPr id="5" name="Summary Zoom 4">
+                <a:extLst>
+                  <a:ext uri="{FF2B5EF4-FFF2-40B4-BE49-F238E27FC236}">
+                    <a16:creationId xmlns:a16="http://schemas.microsoft.com/office/drawing/2014/main" id="{BBC55DF4-539B-4AF5-8FBA-E437AACE296C}"/>
+                  </a:ext>
+                </a:extLst>
+              </p:cNvPr>
+              <p:cNvGrpSpPr>
+                <a:grpSpLocks noGrp="1" noUngrp="1" noRot="1" noChangeAspect="1" noMove="1" noResize="1"/>
+              </p:cNvGrpSpPr>
+              <p:nvPr/>
+            </p:nvGrpSpPr>
+            <p:grpSpPr>
+              <a:xfrm>
+                <a:off x="819150" y="2222500"/>
+                <a:ext cx="10553700" cy="3636963"/>
+                <a:chOff x="819150" y="2222500"/>
+                <a:chExt cx="10553700" cy="3636963"/>
+              </a:xfrm>
+            </p:grpSpPr>
+            <p:pic>
+              <p:nvPicPr>
+                <p:cNvPr id="6" name="Picture 6">
+                  <a:hlinkClick r:id="rId10" action="ppaction://hlinksldjump"/>
+                </p:cNvPr>
+                <p:cNvPicPr>
+                  <a:picLocks noSelect="1" noRot="1" noChangeAspect="1" noMove="1" noResize="1" noEditPoints="1" noAdjustHandles="1" noChangeArrowheads="1" noChangeShapeType="1"/>
+                </p:cNvPicPr>
+                <p:nvPr/>
+              </p:nvPicPr>
+              <p:blipFill>
+                <a:blip r:embed="rId2"/>
+                <a:stretch>
+                  <a:fillRect/>
+                </a:stretch>
+              </p:blipFill>
+              <p:spPr>
+                <a:xfrm>
+                  <a:off x="1213263" y="2660755"/>
+                  <a:ext cx="2374583" cy="1335703"/>
+                </a:xfrm>
+                <a:prstGeom prst="rect">
+                  <a:avLst/>
+                </a:prstGeom>
+                <a:ln w="3175">
+                  <a:solidFill>
+                    <a:prstClr val="ltGray"/>
+                  </a:solidFill>
+                </a:ln>
+              </p:spPr>
+            </p:pic>
+            <p:pic>
+              <p:nvPicPr>
+                <p:cNvPr id="7" name="Picture 7">
+                  <a:hlinkClick r:id="rId11" action="ppaction://hlinksldjump"/>
+                </p:cNvPr>
+                <p:cNvPicPr>
+                  <a:picLocks noSelect="1" noRot="1" noChangeAspect="1" noMove="1" noResize="1" noEditPoints="1" noAdjustHandles="1" noChangeArrowheads="1" noChangeShapeType="1"/>
+                </p:cNvPicPr>
+                <p:nvPr/>
+              </p:nvPicPr>
+              <p:blipFill>
+                <a:blip r:embed="rId3"/>
+                <a:stretch>
+                  <a:fillRect/>
+                </a:stretch>
+              </p:blipFill>
+              <p:spPr>
+                <a:xfrm>
+                  <a:off x="3676893" y="2660755"/>
+                  <a:ext cx="2374583" cy="1335703"/>
+                </a:xfrm>
+                <a:prstGeom prst="rect">
+                  <a:avLst/>
+                </a:prstGeom>
+                <a:ln w="3175">
+                  <a:solidFill>
+                    <a:prstClr val="ltGray"/>
+                  </a:solidFill>
+                </a:ln>
+              </p:spPr>
+            </p:pic>
+            <p:pic>
+              <p:nvPicPr>
+                <p:cNvPr id="8" name="Picture 8">
+                  <a:hlinkClick r:id="rId12" action="ppaction://hlinksldjump"/>
+                </p:cNvPr>
+                <p:cNvPicPr>
+                  <a:picLocks noSelect="1" noRot="1" noChangeAspect="1" noMove="1" noResize="1" noEditPoints="1" noAdjustHandles="1" noChangeArrowheads="1" noChangeShapeType="1"/>
+                </p:cNvPicPr>
+                <p:nvPr/>
+              </p:nvPicPr>
+              <p:blipFill>
+                <a:blip r:embed="rId4"/>
+                <a:stretch>
+                  <a:fillRect/>
+                </a:stretch>
+              </p:blipFill>
+              <p:spPr>
+                <a:xfrm>
+                  <a:off x="6140523" y="2660755"/>
+                  <a:ext cx="2374583" cy="1335703"/>
+                </a:xfrm>
+                <a:prstGeom prst="rect">
+                  <a:avLst/>
+                </a:prstGeom>
+                <a:ln w="3175">
+                  <a:solidFill>
+                    <a:prstClr val="ltGray"/>
+                  </a:solidFill>
+                </a:ln>
+              </p:spPr>
+            </p:pic>
+            <p:pic>
+              <p:nvPicPr>
+                <p:cNvPr id="9" name="Picture 9">
+                  <a:hlinkClick r:id="rId13" action="ppaction://hlinksldjump"/>
+                </p:cNvPr>
+                <p:cNvPicPr>
+                  <a:picLocks noSelect="1" noRot="1" noChangeAspect="1" noMove="1" noResize="1" noEditPoints="1" noAdjustHandles="1" noChangeArrowheads="1" noChangeShapeType="1"/>
+                </p:cNvPicPr>
+                <p:nvPr/>
+              </p:nvPicPr>
+              <p:blipFill>
+                <a:blip r:embed="rId5"/>
+                <a:stretch>
+                  <a:fillRect/>
+                </a:stretch>
+              </p:blipFill>
+              <p:spPr>
+                <a:xfrm>
+                  <a:off x="8604153" y="2660755"/>
+                  <a:ext cx="2374583" cy="1335703"/>
+                </a:xfrm>
+                <a:prstGeom prst="rect">
+                  <a:avLst/>
+                </a:prstGeom>
+                <a:ln w="3175">
+                  <a:solidFill>
+                    <a:prstClr val="ltGray"/>
+                  </a:solidFill>
+                </a:ln>
+              </p:spPr>
+            </p:pic>
+            <p:pic>
+              <p:nvPicPr>
+                <p:cNvPr id="10" name="Picture 10">
+                  <a:hlinkClick r:id="rId14" action="ppaction://hlinksldjump"/>
+                </p:cNvPr>
+                <p:cNvPicPr>
+                  <a:picLocks noSelect="1" noRot="1" noChangeAspect="1" noMove="1" noResize="1" noEditPoints="1" noAdjustHandles="1" noChangeArrowheads="1" noChangeShapeType="1"/>
+                </p:cNvPicPr>
+                <p:nvPr/>
+              </p:nvPicPr>
+              <p:blipFill>
+                <a:blip r:embed="rId6"/>
+                <a:stretch>
+                  <a:fillRect/>
+                </a:stretch>
+              </p:blipFill>
+              <p:spPr>
+                <a:xfrm>
+                  <a:off x="1213263" y="4085505"/>
+                  <a:ext cx="2374583" cy="1335703"/>
+                </a:xfrm>
+                <a:prstGeom prst="rect">
+                  <a:avLst/>
+                </a:prstGeom>
+                <a:ln w="3175">
+                  <a:solidFill>
+                    <a:prstClr val="ltGray"/>
+                  </a:solidFill>
+                </a:ln>
+              </p:spPr>
+            </p:pic>
+            <p:pic>
+              <p:nvPicPr>
+                <p:cNvPr id="11" name="Picture 11">
+                  <a:hlinkClick r:id="rId15" action="ppaction://hlinksldjump"/>
+                </p:cNvPr>
+                <p:cNvPicPr>
+                  <a:picLocks noSelect="1" noRot="1" noChangeAspect="1" noMove="1" noResize="1" noEditPoints="1" noAdjustHandles="1" noChangeArrowheads="1" noChangeShapeType="1"/>
+                </p:cNvPicPr>
+                <p:nvPr/>
+              </p:nvPicPr>
+              <p:blipFill>
+                <a:blip r:embed="rId7"/>
+                <a:stretch>
+                  <a:fillRect/>
+                </a:stretch>
+              </p:blipFill>
+              <p:spPr>
+                <a:xfrm>
+                  <a:off x="3676893" y="4085505"/>
+                  <a:ext cx="2374583" cy="1335703"/>
+                </a:xfrm>
+                <a:prstGeom prst="rect">
+                  <a:avLst/>
+                </a:prstGeom>
+                <a:ln w="3175">
+                  <a:solidFill>
+                    <a:prstClr val="ltGray"/>
+                  </a:solidFill>
+                </a:ln>
+              </p:spPr>
+            </p:pic>
+            <p:pic>
+              <p:nvPicPr>
+                <p:cNvPr id="12" name="Picture 12">
+                  <a:hlinkClick r:id="rId16" action="ppaction://hlinksldjump"/>
+                </p:cNvPr>
+                <p:cNvPicPr>
+                  <a:picLocks noSelect="1" noRot="1" noChangeAspect="1" noMove="1" noResize="1" noEditPoints="1" noAdjustHandles="1" noChangeArrowheads="1" noChangeShapeType="1"/>
+                </p:cNvPicPr>
+                <p:nvPr/>
+              </p:nvPicPr>
+              <p:blipFill>
+                <a:blip r:embed="rId8"/>
+                <a:stretch>
+                  <a:fillRect/>
+                </a:stretch>
+              </p:blipFill>
+              <p:spPr>
+                <a:xfrm>
+                  <a:off x="6140523" y="4085505"/>
+                  <a:ext cx="2374583" cy="1335703"/>
+                </a:xfrm>
+                <a:prstGeom prst="rect">
+                  <a:avLst/>
+                </a:prstGeom>
+                <a:ln w="3175">
+                  <a:solidFill>
+                    <a:prstClr val="ltGray"/>
+                  </a:solidFill>
+                </a:ln>
+              </p:spPr>
+            </p:pic>
+            <p:pic>
+              <p:nvPicPr>
+                <p:cNvPr id="13" name="Picture 13">
+                  <a:hlinkClick r:id="rId17" action="ppaction://hlinksldjump"/>
+                </p:cNvPr>
+                <p:cNvPicPr>
+                  <a:picLocks noSelect="1" noRot="1" noChangeAspect="1" noMove="1" noResize="1" noEditPoints="1" noAdjustHandles="1" noChangeArrowheads="1" noChangeShapeType="1"/>
+                </p:cNvPicPr>
+                <p:nvPr/>
+              </p:nvPicPr>
+              <p:blipFill>
+                <a:blip r:embed="rId9"/>
+                <a:stretch>
+                  <a:fillRect/>
+                </a:stretch>
+              </p:blipFill>
+              <p:spPr>
+                <a:xfrm>
+                  <a:off x="8604153" y="4085505"/>
+                  <a:ext cx="2374583" cy="1335703"/>
+                </a:xfrm>
+                <a:prstGeom prst="rect">
+                  <a:avLst/>
+                </a:prstGeom>
+                <a:ln w="3175">
+                  <a:solidFill>
+                    <a:prstClr val="ltGray"/>
+                  </a:solidFill>
+                </a:ln>
+              </p:spPr>
+            </p:pic>
+          </p:grpSp>
+        </mc:Fallback>
+      </mc:AlternateContent>
+    </p:spTree>
+    <p:extLst>
+      <p:ext uri="{BB962C8B-B14F-4D97-AF65-F5344CB8AC3E}">
+        <p14:creationId xmlns:p14="http://schemas.microsoft.com/office/powerpoint/2010/main" val="2048408449"/>
+      </p:ext>
+    </p:extLst>
+  </p:cSld>
+  <p:clrMapOvr>
+    <a:masterClrMapping/>
+  </p:clrMapOvr>
+  <mc:AlternateContent xmlns:mc="http://schemas.openxmlformats.org/markup-compatibility/2006">
+    <mc:Choice xmlns:p14="http://schemas.microsoft.com/office/powerpoint/2010/main" Requires="p14">
+      <p:transition spd="slow" p14:dur="1250">
+        <p14:switch dir="r"/>
+      </p:transition>
+    </mc:Choice>
+    <mc:Fallback>
+      <p:transition spd="slow">
+        <p:fade/>
+      </p:transition>
+    </mc:Fallback>
+  </mc:AlternateContent>
+</p:sld>
+</file>
+
+<file path=ppt/slides/slide8.xml><?xml version="1.0" encoding="utf-8"?>
+<p:sld xmlns:a="http://schemas.openxmlformats.org/drawingml/2006/main" xmlns:r="http://schemas.openxmlformats.org/officeDocument/2006/relationships" xmlns:p="http://schemas.openxmlformats.org/presentationml/2006/main">
+  <p:cSld>
+    <p:spTree>
+      <p:nvGrpSpPr>
+        <p:cNvPr id="1" name=""/>
+        <p:cNvGrpSpPr/>
+        <p:nvPr/>
+      </p:nvGrpSpPr>
+      <p:grpSpPr>
+        <a:xfrm>
+          <a:off x="0" y="0"/>
+          <a:ext cx="0" cy="0"/>
+          <a:chOff x="0" y="0"/>
+          <a:chExt cx="0" cy="0"/>
+        </a:xfrm>
+      </p:grpSpPr>
+      <p:sp>
+        <p:nvSpPr>
+          <p:cNvPr id="2" name="Title 1">
+            <a:extLst>
+              <a:ext uri="{FF2B5EF4-FFF2-40B4-BE49-F238E27FC236}">
+                <a16:creationId xmlns:a16="http://schemas.microsoft.com/office/drawing/2014/main" id="{A0E347B6-9D87-4240-B007-622872ACF097}"/>
+              </a:ext>
+            </a:extLst>
+          </p:cNvPr>
+          <p:cNvSpPr>
+            <a:spLocks noGrp="1"/>
+          </p:cNvSpPr>
+          <p:nvPr>
+            <p:ph type="title"/>
+          </p:nvPr>
+        </p:nvSpPr>
+        <p:spPr/>
+        <p:txBody>
+          <a:bodyPr/>
+          <a:lstStyle/>
+          <a:p>
+            <a:r>
+              <a:rPr lang="de-DE" dirty="0"/>
+              <a:t>Spieler (Zielgruppe)</a:t>
+            </a:r>
+          </a:p>
+        </p:txBody>
+      </p:sp>
+      <p:sp>
+        <p:nvSpPr>
+          <p:cNvPr id="3" name="Text Placeholder 2">
+            <a:extLst>
+              <a:ext uri="{FF2B5EF4-FFF2-40B4-BE49-F238E27FC236}">
+                <a16:creationId xmlns:a16="http://schemas.microsoft.com/office/drawing/2014/main" id="{9B0836C9-04FE-46DD-96EA-09BD75620C8A}"/>
+              </a:ext>
+            </a:extLst>
+          </p:cNvPr>
+          <p:cNvSpPr>
+            <a:spLocks noGrp="1"/>
+          </p:cNvSpPr>
+          <p:nvPr>
+            <p:ph type="body" idx="1"/>
+          </p:nvPr>
+        </p:nvSpPr>
+        <p:spPr/>
+        <p:txBody>
+          <a:bodyPr/>
+          <a:lstStyle/>
+          <a:p>
+            <a:endParaRPr lang="de-DE"/>
+          </a:p>
+        </p:txBody>
+      </p:sp>
+    </p:spTree>
+    <p:extLst>
+      <p:ext uri="{BB962C8B-B14F-4D97-AF65-F5344CB8AC3E}">
+        <p14:creationId xmlns:p14="http://schemas.microsoft.com/office/powerpoint/2010/main" val="3767224182"/>
+      </p:ext>
+    </p:extLst>
+  </p:cSld>
+  <p:clrMapOvr>
+    <a:masterClrMapping/>
+  </p:clrMapOvr>
+</p:sld>
+</file>
+
+<file path=ppt/slides/slide9.xml><?xml version="1.0" encoding="utf-8"?>
+<p:sld xmlns:a="http://schemas.openxmlformats.org/drawingml/2006/main" xmlns:r="http://schemas.openxmlformats.org/officeDocument/2006/relationships" xmlns:p="http://schemas.openxmlformats.org/presentationml/2006/main">
+  <p:cSld>
+    <p:spTree>
+      <p:nvGrpSpPr>
+        <p:cNvPr id="1" name=""/>
+        <p:cNvGrpSpPr/>
+        <p:nvPr/>
+      </p:nvGrpSpPr>
+      <p:grpSpPr>
+        <a:xfrm>
+          <a:off x="0" y="0"/>
+          <a:ext cx="0" cy="0"/>
+          <a:chOff x="0" y="0"/>
+          <a:chExt cx="0" cy="0"/>
+        </a:xfrm>
+      </p:grpSpPr>
+      <p:sp>
+        <p:nvSpPr>
+          <p:cNvPr id="2" name="Title 1">
+            <a:extLst>
+              <a:ext uri="{FF2B5EF4-FFF2-40B4-BE49-F238E27FC236}">
+                <a16:creationId xmlns:a16="http://schemas.microsoft.com/office/drawing/2014/main" id="{B365A255-200E-4F86-BD21-23E894FAF123}"/>
+              </a:ext>
+            </a:extLst>
+          </p:cNvPr>
+          <p:cNvSpPr>
+            <a:spLocks noGrp="1"/>
+          </p:cNvSpPr>
+          <p:nvPr>
+            <p:ph type="title"/>
+          </p:nvPr>
+        </p:nvSpPr>
+        <p:spPr/>
+        <p:txBody>
+          <a:bodyPr/>
+          <a:lstStyle/>
+          <a:p>
+            <a:r>
+              <a:rPr lang="de-DE" dirty="0"/>
+              <a:t>Gegenstand und Ziel des Spiels</a:t>
+            </a:r>
+          </a:p>
+        </p:txBody>
+      </p:sp>
+      <p:sp>
+        <p:nvSpPr>
+          <p:cNvPr id="3" name="Text Placeholder 2">
+            <a:extLst>
+              <a:ext uri="{FF2B5EF4-FFF2-40B4-BE49-F238E27FC236}">
+                <a16:creationId xmlns:a16="http://schemas.microsoft.com/office/drawing/2014/main" id="{2B52C165-D6F8-448F-A102-823281144D12}"/>
+              </a:ext>
+            </a:extLst>
+          </p:cNvPr>
+          <p:cNvSpPr>
+            <a:spLocks noGrp="1"/>
+          </p:cNvSpPr>
+          <p:nvPr>
+            <p:ph type="body" idx="1"/>
+          </p:nvPr>
+        </p:nvSpPr>
+        <p:spPr/>
+        <p:txBody>
+          <a:bodyPr/>
+          <a:lstStyle/>
+          <a:p>
+            <a:endParaRPr lang="de-DE"/>
+          </a:p>
+        </p:txBody>
+      </p:sp>
+    </p:spTree>
+    <p:extLst>
+      <p:ext uri="{BB962C8B-B14F-4D97-AF65-F5344CB8AC3E}">
+        <p14:creationId xmlns:p14="http://schemas.microsoft.com/office/powerpoint/2010/main" val="1117020876"/>
       </p:ext>
     </p:extLst>
   </p:cSld>

</xml_diff>

<commit_message>
Spritesheet Time gauntlet added
mirrored (looking left) diagonal up, down, side
Regular side (looking right) diagonal up down, side
back
front
</commit_message>
<xml_diff>
--- a/Information/Präsentation.pptx
+++ b/Information/Präsentation.pptx
@@ -199,7 +199,7 @@
 <file path=ppt/charts/chart1.xml><?xml version="1.0" encoding="utf-8"?>
 <c:chartSpace xmlns:c="http://schemas.openxmlformats.org/drawingml/2006/chart" xmlns:a="http://schemas.openxmlformats.org/drawingml/2006/main" xmlns:r="http://schemas.openxmlformats.org/officeDocument/2006/relationships" xmlns:c16r2="http://schemas.microsoft.com/office/drawing/2015/06/chart">
   <c:date1904 val="0"/>
-  <c:lang val="en-US"/>
+  <c:lang val="de-DE"/>
   <c:roundedCorners val="0"/>
   <mc:AlternateContent xmlns:mc="http://schemas.openxmlformats.org/markup-compatibility/2006">
     <mc:Choice xmlns:c14="http://schemas.microsoft.com/office/drawing/2007/8/2/chart" Requires="c14">
@@ -299,10 +299,10 @@
                   <a:bodyPr/>
                   <a:lstStyle/>
                   <a:p>
-                    <a:fld id="{AFD6052D-D0F1-4EBD-9993-440A0E1C9240}" type="CELLRANGE">
+                    <a:fld id="{EAC6AA44-AA5B-4489-BD5B-1B8060D23B84}" type="CELLRANGE">
                       <a:rPr lang="de-DE"/>
                       <a:pPr/>
-                      <a:t>[CELLRANGE]</a:t>
+                      <a:t>[ZELLBEREICH]</a:t>
                     </a:fld>
                     <a:endParaRPr lang="de-DE"/>
                   </a:p>
@@ -333,10 +333,10 @@
                   <a:bodyPr/>
                   <a:lstStyle/>
                   <a:p>
-                    <a:fld id="{99E34118-8E32-4780-B139-1D4162428389}" type="CELLRANGE">
+                    <a:fld id="{F01BDBAC-1EED-439A-BFDC-52BB00C75D18}" type="CELLRANGE">
                       <a:rPr lang="de-DE"/>
                       <a:pPr/>
-                      <a:t>[CELLRANGE]</a:t>
+                      <a:t>[ZELLBEREICH]</a:t>
                     </a:fld>
                     <a:endParaRPr lang="de-DE"/>
                   </a:p>
@@ -367,10 +367,10 @@
                   <a:bodyPr/>
                   <a:lstStyle/>
                   <a:p>
-                    <a:fld id="{45C54CB9-E392-401A-B61B-12904F3E3459}" type="CELLRANGE">
+                    <a:fld id="{339B3B1D-77D6-47FD-93F8-7BD44E0B2148}" type="CELLRANGE">
                       <a:rPr lang="de-DE"/>
                       <a:pPr/>
-                      <a:t>[CELLRANGE]</a:t>
+                      <a:t>[ZELLBEREICH]</a:t>
                     </a:fld>
                     <a:endParaRPr lang="de-DE"/>
                   </a:p>
@@ -401,10 +401,10 @@
                   <a:bodyPr/>
                   <a:lstStyle/>
                   <a:p>
-                    <a:fld id="{A052F8DA-171B-4BAC-86AC-B475A0D01659}" type="CELLRANGE">
+                    <a:fld id="{AEC3071D-4415-4EF6-861B-AE0093260347}" type="CELLRANGE">
                       <a:rPr lang="de-DE"/>
                       <a:pPr/>
-                      <a:t>[CELLRANGE]</a:t>
+                      <a:t>[ZELLBEREICH]</a:t>
                     </a:fld>
                     <a:endParaRPr lang="de-DE"/>
                   </a:p>
@@ -435,10 +435,10 @@
                   <a:bodyPr/>
                   <a:lstStyle/>
                   <a:p>
-                    <a:fld id="{A0769335-703A-4E27-A90B-2A65818B0486}" type="CELLRANGE">
+                    <a:fld id="{D9A9401D-01FF-4F30-A23B-A2B278875D58}" type="CELLRANGE">
                       <a:rPr lang="de-DE"/>
                       <a:pPr/>
-                      <a:t>[CELLRANGE]</a:t>
+                      <a:t>[ZELLBEREICH]</a:t>
                     </a:fld>
                     <a:endParaRPr lang="de-DE"/>
                   </a:p>
@@ -469,10 +469,10 @@
                   <a:bodyPr/>
                   <a:lstStyle/>
                   <a:p>
-                    <a:fld id="{D38F9DC9-25CD-4E01-ACFA-D872496772CC}" type="CELLRANGE">
+                    <a:fld id="{B2693386-C7C9-49E8-817A-DB9620A81301}" type="CELLRANGE">
                       <a:rPr lang="de-DE"/>
                       <a:pPr/>
-                      <a:t>[CELLRANGE]</a:t>
+                      <a:t>[ZELLBEREICH]</a:t>
                     </a:fld>
                     <a:endParaRPr lang="de-DE"/>
                   </a:p>
@@ -503,10 +503,10 @@
                   <a:bodyPr/>
                   <a:lstStyle/>
                   <a:p>
-                    <a:fld id="{FBE93D09-E7CC-40EE-B201-3000A9C713D0}" type="CELLRANGE">
+                    <a:fld id="{68647065-43E2-4C2E-8887-239AD6658698}" type="CELLRANGE">
                       <a:rPr lang="de-DE"/>
                       <a:pPr/>
-                      <a:t>[CELLRANGE]</a:t>
+                      <a:t>[ZELLBEREICH]</a:t>
                     </a:fld>
                     <a:endParaRPr lang="de-DE"/>
                   </a:p>
@@ -537,10 +537,10 @@
                   <a:bodyPr/>
                   <a:lstStyle/>
                   <a:p>
-                    <a:fld id="{26978E52-0038-46B2-B741-CA2248AD3489}" type="CELLRANGE">
+                    <a:fld id="{0D51839C-2200-446E-A13F-9C1F8FDB5D35}" type="CELLRANGE">
                       <a:rPr lang="de-DE"/>
                       <a:pPr/>
-                      <a:t>[CELLRANGE]</a:t>
+                      <a:t>[ZELLBEREICH]</a:t>
                     </a:fld>
                     <a:endParaRPr lang="de-DE"/>
                   </a:p>
@@ -571,10 +571,10 @@
                   <a:bodyPr/>
                   <a:lstStyle/>
                   <a:p>
-                    <a:fld id="{559EA2E5-71A4-4C74-A354-14CC88B470DF}" type="CELLRANGE">
+                    <a:fld id="{6C444A07-77B4-45EB-89FD-53AA1F2488E0}" type="CELLRANGE">
                       <a:rPr lang="de-DE"/>
                       <a:pPr/>
-                      <a:t>[CELLRANGE]</a:t>
+                      <a:t>[ZELLBEREICH]</a:t>
                     </a:fld>
                     <a:endParaRPr lang="de-DE"/>
                   </a:p>
@@ -605,10 +605,10 @@
                   <a:bodyPr/>
                   <a:lstStyle/>
                   <a:p>
-                    <a:fld id="{AAAB9519-38D8-461B-90F5-679F06442D63}" type="CELLRANGE">
+                    <a:fld id="{CCC88F3F-95F5-4870-BDD6-CC49DE7BBD05}" type="CELLRANGE">
                       <a:rPr lang="de-DE"/>
                       <a:pPr/>
-                      <a:t>[CELLRANGE]</a:t>
+                      <a:t>[ZELLBEREICH]</a:t>
                     </a:fld>
                     <a:endParaRPr lang="de-DE"/>
                   </a:p>
@@ -639,10 +639,10 @@
                   <a:bodyPr/>
                   <a:lstStyle/>
                   <a:p>
-                    <a:fld id="{18175851-814F-4C3F-AD7A-805BE7DD9856}" type="CELLRANGE">
+                    <a:fld id="{89A10ED6-93D5-4436-89B7-6AA90A7ED8D3}" type="CELLRANGE">
                       <a:rPr lang="de-DE"/>
                       <a:pPr/>
-                      <a:t>[CELLRANGE]</a:t>
+                      <a:t>[ZELLBEREICH]</a:t>
                     </a:fld>
                     <a:endParaRPr lang="de-DE"/>
                   </a:p>
@@ -673,10 +673,10 @@
                   <a:bodyPr/>
                   <a:lstStyle/>
                   <a:p>
-                    <a:fld id="{BAC0A449-B9BA-413E-90AC-9BF1A2309F68}" type="CELLRANGE">
+                    <a:fld id="{1C47B5CD-1DEA-4AD2-A5EF-79396CB5E98D}" type="CELLRANGE">
                       <a:rPr lang="de-DE"/>
                       <a:pPr/>
-                      <a:t>[CELLRANGE]</a:t>
+                      <a:t>[ZELLBEREICH]</a:t>
                     </a:fld>
                     <a:endParaRPr lang="de-DE"/>
                   </a:p>
@@ -751,7 +751,7 @@
                     <a:cs typeface="+mn-cs"/>
                   </a:defRPr>
                 </a:pPr>
-                <a:endParaRPr lang="en-DE"/>
+                <a:endParaRPr lang="de-DE"/>
               </a:p>
             </c:txPr>
             <c:dLblPos val="l"/>
@@ -1241,10 +1241,10 @@
                   <a:bodyPr/>
                   <a:lstStyle/>
                   <a:p>
-                    <a:fld id="{DE79DBCA-43DE-4847-8CE7-CF0476237E17}" type="CELLRANGE">
+                    <a:fld id="{B48DA021-1D0B-47A7-AEB4-D5F0CB3CDA29}" type="CELLRANGE">
                       <a:rPr lang="de-DE"/>
                       <a:pPr/>
-                      <a:t>[CELLRANGE]</a:t>
+                      <a:t>[ZELLBEREICH]</a:t>
                     </a:fld>
                     <a:endParaRPr lang="de-DE"/>
                   </a:p>
@@ -1275,10 +1275,10 @@
                   <a:bodyPr/>
                   <a:lstStyle/>
                   <a:p>
-                    <a:fld id="{8A41E882-289F-4311-80FF-4A2D67FABB2F}" type="CELLRANGE">
+                    <a:fld id="{073C5D3B-AB4F-4923-84AE-48A62D36A4DA}" type="CELLRANGE">
                       <a:rPr lang="de-DE"/>
                       <a:pPr/>
-                      <a:t>[CELLRANGE]</a:t>
+                      <a:t>[ZELLBEREICH]</a:t>
                     </a:fld>
                     <a:endParaRPr lang="de-DE"/>
                   </a:p>
@@ -1309,10 +1309,10 @@
                   <a:bodyPr/>
                   <a:lstStyle/>
                   <a:p>
-                    <a:fld id="{67CAA20D-D345-438E-9950-DCB0C941DC2E}" type="CELLRANGE">
+                    <a:fld id="{7EE6D3D0-A92C-42F1-BAA5-76D779577913}" type="CELLRANGE">
                       <a:rPr lang="de-DE"/>
                       <a:pPr/>
-                      <a:t>[CELLRANGE]</a:t>
+                      <a:t>[ZELLBEREICH]</a:t>
                     </a:fld>
                     <a:endParaRPr lang="de-DE"/>
                   </a:p>
@@ -1343,10 +1343,10 @@
                   <a:bodyPr/>
                   <a:lstStyle/>
                   <a:p>
-                    <a:fld id="{868D7B10-814B-4A63-B907-C4DD25ECD3E9}" type="CELLRANGE">
+                    <a:fld id="{C3895EF4-AF07-4232-B093-888049C076D2}" type="CELLRANGE">
                       <a:rPr lang="de-DE"/>
                       <a:pPr/>
-                      <a:t>[CELLRANGE]</a:t>
+                      <a:t>[ZELLBEREICH]</a:t>
                     </a:fld>
                     <a:endParaRPr lang="de-DE"/>
                   </a:p>
@@ -1377,10 +1377,10 @@
                   <a:bodyPr/>
                   <a:lstStyle/>
                   <a:p>
-                    <a:fld id="{549637D4-7345-4C5A-B054-E9208603C0C1}" type="CELLRANGE">
+                    <a:fld id="{2460653F-B607-4229-95EA-29B21A4EAA83}" type="CELLRANGE">
                       <a:rPr lang="de-DE"/>
                       <a:pPr/>
-                      <a:t>[CELLRANGE]</a:t>
+                      <a:t>[ZELLBEREICH]</a:t>
                     </a:fld>
                     <a:endParaRPr lang="de-DE"/>
                   </a:p>
@@ -1411,10 +1411,10 @@
                   <a:bodyPr/>
                   <a:lstStyle/>
                   <a:p>
-                    <a:fld id="{6B394819-0C04-4D2B-820B-15D5E182A911}" type="CELLRANGE">
+                    <a:fld id="{D903D81E-1FCC-4CAD-866D-B77DD9AE7E89}" type="CELLRANGE">
                       <a:rPr lang="de-DE"/>
                       <a:pPr/>
-                      <a:t>[CELLRANGE]</a:t>
+                      <a:t>[ZELLBEREICH]</a:t>
                     </a:fld>
                     <a:endParaRPr lang="de-DE"/>
                   </a:p>
@@ -1487,7 +1487,7 @@
                     <a:cs typeface="+mn-cs"/>
                   </a:defRPr>
                 </a:pPr>
-                <a:endParaRPr lang="en-DE"/>
+                <a:endParaRPr lang="de-DE"/>
               </a:p>
             </c:txPr>
             <c:dLblPos val="t"/>
@@ -1705,7 +1705,7 @@
                 <a:cs typeface="+mn-cs"/>
               </a:defRPr>
             </a:pPr>
-            <a:endParaRPr lang="en-DE"/>
+            <a:endParaRPr lang="de-DE"/>
           </a:p>
         </c:txPr>
         <c:crossAx val="484834552"/>
@@ -1766,7 +1766,7 @@
       <a:pPr>
         <a:defRPr/>
       </a:pPr>
-      <a:endParaRPr lang="en-DE"/>
+      <a:endParaRPr lang="de-DE"/>
     </a:p>
   </c:txPr>
   <c:externalData r:id="rId3">
@@ -6035,7 +6035,7 @@
           <a:p>
             <a:fld id="{E50B3C79-A904-4F35-8EE8-3F2172FFB220}" type="datetimeFigureOut">
               <a:rPr lang="de-DE" smtClean="0"/>
-              <a:t>10.05.2019</a:t>
+              <a:t>13.05.2019</a:t>
             </a:fld>
             <a:endParaRPr lang="de-DE"/>
           </a:p>
@@ -6194,7 +6194,7 @@
           <a:p>
             <a:fld id="{6BAD1AF2-A6B3-4B84-B5D2-6F16B2D7100D}" type="slidenum">
               <a:rPr lang="de-DE" smtClean="0"/>
-              <a:t>‹#›</a:t>
+              <a:t>‹Nr.›</a:t>
             </a:fld>
             <a:endParaRPr lang="de-DE"/>
           </a:p>
@@ -9103,7 +9103,7 @@
           <a:effectLst/>
           <a:extLst>
             <a:ext uri="{91240B29-F687-4f45-9708-019B960494DF}">
-              <a14:hiddenLine xmlns:a14="http://schemas.microsoft.com/office/drawing/2010/main" xmlns="" w="9525">
+              <a14:hiddenLine xmlns="" xmlns:a14="http://schemas.microsoft.com/office/drawing/2010/main" w="9525">
                 <a:solidFill>
                   <a:srgbClr val="000000"/>
                 </a:solidFill>
@@ -9296,7 +9296,7 @@
             <a:fld id="{08B9EBBA-996F-894A-B54A-D6246ED52CEA}" type="datetimeFigureOut">
               <a:rPr lang="en-US" dirty="0"/>
               <a:pPr/>
-              <a:t>5/10/2019</a:t>
+              <a:t>5/13/2019</a:t>
             </a:fld>
             <a:endParaRPr lang="en-US" dirty="0"/>
           </a:p>
@@ -9339,7 +9339,7 @@
             <a:fld id="{D57F1E4F-1CFF-5643-939E-217C01CDF565}" type="slidenum">
               <a:rPr lang="en-US" dirty="0"/>
               <a:pPr/>
-              <a:t>‹#›</a:t>
+              <a:t>‹Nr.›</a:t>
             </a:fld>
             <a:endParaRPr lang="en-US" dirty="0"/>
           </a:p>
@@ -9606,7 +9606,7 @@
             <a:fld id="{18C79C5D-2A6F-F04D-97DA-BEF2467B64E4}" type="datetimeFigureOut">
               <a:rPr lang="en-US" dirty="0"/>
               <a:pPr/>
-              <a:t>5/10/2019</a:t>
+              <a:t>5/13/2019</a:t>
             </a:fld>
             <a:endParaRPr lang="en-US" dirty="0"/>
           </a:p>
@@ -9659,7 +9659,7 @@
             <a:fld id="{D57F1E4F-1CFF-5643-939E-217C01CDF565}" type="slidenum">
               <a:rPr lang="en-US" dirty="0"/>
               <a:pPr/>
-              <a:t>‹#›</a:t>
+              <a:t>‹Nr.›</a:t>
             </a:fld>
             <a:endParaRPr lang="en-US" dirty="0"/>
           </a:p>
@@ -9931,7 +9931,7 @@
             <a:fld id="{18C79C5D-2A6F-F04D-97DA-BEF2467B64E4}" type="datetimeFigureOut">
               <a:rPr lang="en-US" dirty="0"/>
               <a:pPr/>
-              <a:t>5/10/2019</a:t>
+              <a:t>5/13/2019</a:t>
             </a:fld>
             <a:endParaRPr lang="en-US" dirty="0"/>
           </a:p>
@@ -9974,7 +9974,7 @@
             <a:fld id="{D57F1E4F-1CFF-5643-939E-217C01CDF565}" type="slidenum">
               <a:rPr lang="en-US" dirty="0"/>
               <a:pPr/>
-              <a:t>‹#›</a:t>
+              <a:t>‹Nr.›</a:t>
             </a:fld>
             <a:endParaRPr lang="en-US" dirty="0"/>
           </a:p>
@@ -10416,7 +10416,7 @@
             <a:fld id="{8DFA1846-DA80-1C48-A609-854EA85C59AD}" type="datetimeFigureOut">
               <a:rPr lang="en-US" dirty="0"/>
               <a:pPr/>
-              <a:t>5/10/2019</a:t>
+              <a:t>5/13/2019</a:t>
             </a:fld>
             <a:endParaRPr lang="en-US" dirty="0"/>
           </a:p>
@@ -10459,7 +10459,7 @@
             <a:fld id="{D57F1E4F-1CFF-5643-939E-217C01CDF565}" type="slidenum">
               <a:rPr lang="en-US" dirty="0"/>
               <a:pPr/>
-              <a:t>‹#›</a:t>
+              <a:t>‹Nr.›</a:t>
             </a:fld>
             <a:endParaRPr lang="en-US" dirty="0"/>
           </a:p>
@@ -10782,7 +10782,7 @@
             <a:fld id="{FBF54567-0DE4-3F47-BF90-CB84690072F9}" type="datetimeFigureOut">
               <a:rPr lang="en-US" dirty="0"/>
               <a:pPr/>
-              <a:t>5/10/2019</a:t>
+              <a:t>5/13/2019</a:t>
             </a:fld>
             <a:endParaRPr lang="en-US" dirty="0"/>
           </a:p>
@@ -10825,7 +10825,7 @@
             <a:fld id="{D57F1E4F-1CFF-5643-939E-217C01CDF565}" type="slidenum">
               <a:rPr lang="en-US" dirty="0"/>
               <a:pPr/>
-              <a:t>‹#›</a:t>
+              <a:t>‹Nr.›</a:t>
             </a:fld>
             <a:endParaRPr lang="en-US" dirty="0"/>
           </a:p>
@@ -10933,7 +10933,7 @@
           <a:ln/>
           <a:extLst>
             <a:ext uri="{91240B29-F687-4f45-9708-019B960494DF}">
-              <a14:hiddenLine xmlns:a14="http://schemas.microsoft.com/office/drawing/2010/main" xmlns="" w="9525">
+              <a14:hiddenLine xmlns="" xmlns:a14="http://schemas.microsoft.com/office/drawing/2010/main" w="9525">
                 <a:solidFill>
                   <a:srgbClr val="000000"/>
                 </a:solidFill>
@@ -11052,7 +11052,7 @@
             <a:fld id="{C6C52C72-DE31-F449-A4ED-4C594FD91407}" type="datetimeFigureOut">
               <a:rPr lang="en-US" dirty="0"/>
               <a:pPr/>
-              <a:t>5/10/2019</a:t>
+              <a:t>5/13/2019</a:t>
             </a:fld>
             <a:endParaRPr lang="en-US" dirty="0"/>
           </a:p>
@@ -11095,7 +11095,7 @@
             <a:fld id="{D57F1E4F-1CFF-5643-939E-217C01CDF565}" type="slidenum">
               <a:rPr lang="en-US" dirty="0"/>
               <a:pPr/>
-              <a:t>‹#›</a:t>
+              <a:t>‹Nr.›</a:t>
             </a:fld>
             <a:endParaRPr lang="en-US" dirty="0"/>
           </a:p>
@@ -11205,7 +11205,7 @@
           <a:ln/>
           <a:extLst>
             <a:ext uri="{91240B29-F687-4f45-9708-019B960494DF}">
-              <a14:hiddenLine xmlns:a14="http://schemas.microsoft.com/office/drawing/2010/main" xmlns="" w="9525">
+              <a14:hiddenLine xmlns="" xmlns:a14="http://schemas.microsoft.com/office/drawing/2010/main" w="9525">
                 <a:solidFill>
                   <a:srgbClr val="000000"/>
                 </a:solidFill>
@@ -11334,7 +11334,7 @@
             <a:fld id="{ED62726E-379B-B349-9EED-81ED093FA806}" type="datetimeFigureOut">
               <a:rPr lang="en-US" dirty="0"/>
               <a:pPr/>
-              <a:t>5/10/2019</a:t>
+              <a:t>5/13/2019</a:t>
             </a:fld>
             <a:endParaRPr lang="en-US" dirty="0"/>
           </a:p>
@@ -11377,7 +11377,7 @@
             <a:fld id="{D57F1E4F-1CFF-5643-939E-217C01CDF565}" type="slidenum">
               <a:rPr lang="en-US" dirty="0"/>
               <a:pPr/>
-              <a:t>‹#›</a:t>
+              <a:t>‹Nr.›</a:t>
             </a:fld>
             <a:endParaRPr lang="en-US" dirty="0"/>
           </a:p>
@@ -11575,7 +11575,7 @@
             <a:fld id="{08B9EBBA-996F-894A-B54A-D6246ED52CEA}" type="datetimeFigureOut">
               <a:rPr lang="en-US" dirty="0"/>
               <a:pPr/>
-              <a:t>5/10/2019</a:t>
+              <a:t>5/13/2019</a:t>
             </a:fld>
             <a:endParaRPr lang="en-US" dirty="0"/>
           </a:p>
@@ -11618,7 +11618,7 @@
             <a:fld id="{D57F1E4F-1CFF-5643-939E-217C01CDF565}" type="slidenum">
               <a:rPr lang="en-US" dirty="0"/>
               <a:pPr/>
-              <a:t>‹#›</a:t>
+              <a:t>‹Nr.›</a:t>
             </a:fld>
             <a:endParaRPr lang="en-US" dirty="0"/>
           </a:p>
@@ -11761,7 +11761,7 @@
           <a:ln/>
           <a:extLst>
             <a:ext uri="{91240B29-F687-4f45-9708-019B960494DF}">
-              <a14:hiddenLine xmlns:a14="http://schemas.microsoft.com/office/drawing/2010/main" xmlns="" w="9525">
+              <a14:hiddenLine xmlns="" xmlns:a14="http://schemas.microsoft.com/office/drawing/2010/main" w="9525">
                 <a:solidFill>
                   <a:srgbClr val="000000"/>
                 </a:solidFill>
@@ -11890,7 +11890,7 @@
             <a:fld id="{9B3A1323-8D79-1946-B0D7-40001CF92E9D}" type="datetimeFigureOut">
               <a:rPr lang="en-US" dirty="0"/>
               <a:pPr/>
-              <a:t>5/10/2019</a:t>
+              <a:t>5/13/2019</a:t>
             </a:fld>
             <a:endParaRPr lang="en-US" dirty="0"/>
           </a:p>
@@ -11933,7 +11933,7 @@
             <a:fld id="{D57F1E4F-1CFF-5643-939E-217C01CDF565}" type="slidenum">
               <a:rPr lang="en-US" dirty="0"/>
               <a:pPr/>
-              <a:t>‹#›</a:t>
+              <a:t>‹Nr.›</a:t>
             </a:fld>
             <a:endParaRPr lang="en-US" dirty="0"/>
           </a:p>
@@ -12230,7 +12230,7 @@
             <a:fld id="{8DFA1846-DA80-1C48-A609-854EA85C59AD}" type="datetimeFigureOut">
               <a:rPr lang="en-US" dirty="0"/>
               <a:pPr/>
-              <a:t>5/10/2019</a:t>
+              <a:t>5/13/2019</a:t>
             </a:fld>
             <a:endParaRPr lang="en-US" dirty="0"/>
           </a:p>
@@ -12273,7 +12273,7 @@
             <a:fld id="{D57F1E4F-1CFF-5643-939E-217C01CDF565}" type="slidenum">
               <a:rPr lang="en-US" dirty="0"/>
               <a:pPr/>
-              <a:t>‹#›</a:t>
+              <a:t>‹Nr.›</a:t>
             </a:fld>
             <a:endParaRPr lang="en-US" dirty="0"/>
           </a:p>
@@ -12381,7 +12381,7 @@
           <a:ln/>
           <a:extLst>
             <a:ext uri="{91240B29-F687-4f45-9708-019B960494DF}">
-              <a14:hiddenLine xmlns:a14="http://schemas.microsoft.com/office/drawing/2010/main" xmlns="" w="9525">
+              <a14:hiddenLine xmlns="" xmlns:a14="http://schemas.microsoft.com/office/drawing/2010/main" w="9525">
                 <a:solidFill>
                   <a:srgbClr val="000000"/>
                 </a:solidFill>
@@ -12566,7 +12566,7 @@
             <a:fld id="{57302355-E14B-8545-A8F8-0FE83CC9D524}" type="datetimeFigureOut">
               <a:rPr lang="en-US" dirty="0"/>
               <a:pPr/>
-              <a:t>5/10/2019</a:t>
+              <a:t>5/13/2019</a:t>
             </a:fld>
             <a:endParaRPr lang="en-US" dirty="0"/>
           </a:p>
@@ -12609,7 +12609,7 @@
             <a:fld id="{D57F1E4F-1CFF-5643-939E-217C01CDF565}" type="slidenum">
               <a:rPr lang="en-US" dirty="0"/>
               <a:pPr/>
-              <a:t>‹#›</a:t>
+              <a:t>‹Nr.›</a:t>
             </a:fld>
             <a:endParaRPr lang="en-US" dirty="0"/>
           </a:p>
@@ -12717,7 +12717,7 @@
           <a:ln/>
           <a:extLst>
             <a:ext uri="{91240B29-F687-4f45-9708-019B960494DF}">
-              <a14:hiddenLine xmlns:a14="http://schemas.microsoft.com/office/drawing/2010/main" xmlns="" w="9525">
+              <a14:hiddenLine xmlns="" xmlns:a14="http://schemas.microsoft.com/office/drawing/2010/main" w="9525">
                 <a:solidFill>
                   <a:srgbClr val="000000"/>
                 </a:solidFill>
@@ -13040,7 +13040,7 @@
             <a:fld id="{02640F58-564D-2B4F-AE67-E407BA4FCF45}" type="datetimeFigureOut">
               <a:rPr lang="en-US" dirty="0"/>
               <a:pPr/>
-              <a:t>5/10/2019</a:t>
+              <a:t>5/13/2019</a:t>
             </a:fld>
             <a:endParaRPr lang="en-US" dirty="0"/>
           </a:p>
@@ -13083,7 +13083,7 @@
             <a:fld id="{D57F1E4F-1CFF-5643-939E-217C01CDF565}" type="slidenum">
               <a:rPr lang="en-US" dirty="0"/>
               <a:pPr/>
-              <a:t>‹#›</a:t>
+              <a:t>‹Nr.›</a:t>
             </a:fld>
             <a:endParaRPr lang="en-US" dirty="0"/>
           </a:p>
@@ -13191,7 +13191,7 @@
           <a:ln/>
           <a:extLst>
             <a:ext uri="{91240B29-F687-4f45-9708-019B960494DF}">
-              <a14:hiddenLine xmlns:a14="http://schemas.microsoft.com/office/drawing/2010/main" xmlns="" w="9525">
+              <a14:hiddenLine xmlns="" xmlns:a14="http://schemas.microsoft.com/office/drawing/2010/main" w="9525">
                 <a:solidFill>
                   <a:srgbClr val="000000"/>
                 </a:solidFill>
@@ -13258,7 +13258,7 @@
             <a:fld id="{F13A34C8-038E-2045-AF43-DF7DBB8E0E9E}" type="datetimeFigureOut">
               <a:rPr lang="en-US" dirty="0"/>
               <a:pPr/>
-              <a:t>5/10/2019</a:t>
+              <a:t>5/13/2019</a:t>
             </a:fld>
             <a:endParaRPr lang="en-US" dirty="0"/>
           </a:p>
@@ -13301,7 +13301,7 @@
             <a:fld id="{D57F1E4F-1CFF-5643-939E-217C01CDF565}" type="slidenum">
               <a:rPr lang="en-US" dirty="0"/>
               <a:pPr/>
-              <a:t>‹#›</a:t>
+              <a:t>‹Nr.›</a:t>
             </a:fld>
             <a:endParaRPr lang="en-US" dirty="0"/>
           </a:p>
@@ -13350,7 +13350,7 @@
             <a:fld id="{8818C68F-D26B-8F47-958C-23B49CF8A634}" type="datetimeFigureOut">
               <a:rPr lang="en-US" dirty="0"/>
               <a:pPr/>
-              <a:t>5/10/2019</a:t>
+              <a:t>5/13/2019</a:t>
             </a:fld>
             <a:endParaRPr lang="en-US" dirty="0"/>
           </a:p>
@@ -13393,7 +13393,7 @@
             <a:fld id="{D57F1E4F-1CFF-5643-939E-217C01CDF565}" type="slidenum">
               <a:rPr lang="en-US" dirty="0"/>
               <a:pPr/>
-              <a:t>‹#›</a:t>
+              <a:t>‹Nr.›</a:t>
             </a:fld>
             <a:endParaRPr lang="en-US" dirty="0"/>
           </a:p>
@@ -13614,7 +13614,7 @@
           <a:ln/>
           <a:extLst>
             <a:ext uri="{91240B29-F687-4f45-9708-019B960494DF}">
-              <a14:hiddenLine xmlns:a14="http://schemas.microsoft.com/office/drawing/2010/main" xmlns="" w="9525">
+              <a14:hiddenLine xmlns="" xmlns:a14="http://schemas.microsoft.com/office/drawing/2010/main" w="9525">
                 <a:solidFill>
                   <a:srgbClr val="000000"/>
                 </a:solidFill>
@@ -13814,7 +13814,7 @@
             <a:fld id="{D0DF5E60-9974-AC48-9591-99C2BB44B7CF}" type="datetimeFigureOut">
               <a:rPr lang="en-US" dirty="0"/>
               <a:pPr/>
-              <a:t>5/10/2019</a:t>
+              <a:t>5/13/2019</a:t>
             </a:fld>
             <a:endParaRPr lang="en-US" dirty="0"/>
           </a:p>
@@ -13857,7 +13857,7 @@
             <a:fld id="{D57F1E4F-1CFF-5643-939E-217C01CDF565}" type="slidenum">
               <a:rPr lang="en-US" dirty="0"/>
               <a:pPr/>
-              <a:t>‹#›</a:t>
+              <a:t>‹Nr.›</a:t>
             </a:fld>
             <a:endParaRPr lang="en-US" dirty="0"/>
           </a:p>
@@ -14074,7 +14074,7 @@
             <a:fld id="{09B482E8-6E0E-1B4F-B1FD-C69DB9E858D9}" type="datetimeFigureOut">
               <a:rPr lang="en-US" dirty="0"/>
               <a:pPr/>
-              <a:t>5/10/2019</a:t>
+              <a:t>5/13/2019</a:t>
             </a:fld>
             <a:endParaRPr lang="en-US" dirty="0"/>
           </a:p>
@@ -14114,7 +14114,7 @@
             <a:fld id="{D57F1E4F-1CFF-5643-939E-217C01CDF565}" type="slidenum">
               <a:rPr lang="en-US" dirty="0"/>
               <a:pPr/>
-              <a:t>‹#›</a:t>
+              <a:t>‹Nr.›</a:t>
             </a:fld>
             <a:endParaRPr lang="en-US" dirty="0"/>
           </a:p>
@@ -15078,7 +15078,7 @@
           <a:effectLst/>
           <a:extLst>
             <a:ext uri="{91240B29-F687-4f45-9708-019B960494DF}">
-              <a14:hiddenLine xmlns="" xmlns:a14="http://schemas.microsoft.com/office/drawing/2010/main" xmlns:p14="http://schemas.microsoft.com/office/powerpoint/2010/main" xmlns:a16="http://schemas.microsoft.com/office/drawing/2014/main" w="9525">
+              <a14:hiddenLine xmlns:a16="http://schemas.microsoft.com/office/drawing/2014/main" xmlns:p14="http://schemas.microsoft.com/office/powerpoint/2010/main" xmlns:a14="http://schemas.microsoft.com/office/drawing/2010/main" xmlns="" w="9525">
                 <a:solidFill>
                   <a:srgbClr val="000000"/>
                 </a:solidFill>
@@ -16751,7 +16751,7 @@
           <a:effectLst/>
           <a:extLst>
             <a:ext uri="{91240B29-F687-4f45-9708-019B960494DF}">
-              <a14:hiddenLine xmlns="" xmlns:a14="http://schemas.microsoft.com/office/drawing/2010/main" xmlns:p14="http://schemas.microsoft.com/office/powerpoint/2010/main" xmlns:a16="http://schemas.microsoft.com/office/drawing/2014/main" w="9525">
+              <a14:hiddenLine xmlns:a16="http://schemas.microsoft.com/office/drawing/2014/main" xmlns:p14="http://schemas.microsoft.com/office/powerpoint/2010/main" xmlns:a14="http://schemas.microsoft.com/office/drawing/2010/main" xmlns="" w="9525">
                 <a:solidFill>
                   <a:srgbClr val="000000"/>
                 </a:solidFill>
@@ -17336,7 +17336,7 @@
           <a:effectLst/>
           <a:extLst>
             <a:ext uri="{91240B29-F687-4f45-9708-019B960494DF}">
-              <a14:hiddenLine xmlns="" xmlns:a14="http://schemas.microsoft.com/office/drawing/2010/main" xmlns:p14="http://schemas.microsoft.com/office/powerpoint/2010/main" xmlns:a16="http://schemas.microsoft.com/office/drawing/2014/main" w="9525">
+              <a14:hiddenLine xmlns:a16="http://schemas.microsoft.com/office/drawing/2014/main" xmlns:p14="http://schemas.microsoft.com/office/powerpoint/2010/main" xmlns:a14="http://schemas.microsoft.com/office/drawing/2010/main" xmlns="" w="9525">
                 <a:solidFill>
                   <a:srgbClr val="000000"/>
                 </a:solidFill>
@@ -18912,7 +18912,7 @@
           <a:effectLst/>
           <a:extLst>
             <a:ext uri="{91240B29-F687-4f45-9708-019B960494DF}">
-              <a14:hiddenLine xmlns="" xmlns:a14="http://schemas.microsoft.com/office/drawing/2010/main" xmlns:p14="http://schemas.microsoft.com/office/powerpoint/2010/main" xmlns:a16="http://schemas.microsoft.com/office/drawing/2014/main" w="9525">
+              <a14:hiddenLine xmlns:a16="http://schemas.microsoft.com/office/drawing/2014/main" xmlns:p14="http://schemas.microsoft.com/office/powerpoint/2010/main" xmlns:a14="http://schemas.microsoft.com/office/drawing/2010/main" xmlns="" w="9525">
                 <a:solidFill>
                   <a:srgbClr val="000000"/>
                 </a:solidFill>
@@ -20036,7 +20036,7 @@
           <a:effectLst/>
           <a:extLst>
             <a:ext uri="{91240B29-F687-4f45-9708-019B960494DF}">
-              <a14:hiddenLine xmlns="" xmlns:a14="http://schemas.microsoft.com/office/drawing/2010/main" xmlns:p14="http://schemas.microsoft.com/office/powerpoint/2010/main" xmlns:a16="http://schemas.microsoft.com/office/drawing/2014/main" w="9525">
+              <a14:hiddenLine xmlns:a16="http://schemas.microsoft.com/office/drawing/2014/main" xmlns:p14="http://schemas.microsoft.com/office/powerpoint/2010/main" xmlns:a14="http://schemas.microsoft.com/office/drawing/2010/main" xmlns="" w="9525">
                 <a:solidFill>
                   <a:srgbClr val="000000"/>
                 </a:solidFill>
@@ -20543,7 +20543,7 @@
           <a:effectLst/>
           <a:extLst>
             <a:ext uri="{91240B29-F687-4f45-9708-019B960494DF}">
-              <a14:hiddenLine xmlns="" xmlns:a14="http://schemas.microsoft.com/office/drawing/2010/main" xmlns:p14="http://schemas.microsoft.com/office/powerpoint/2010/main" xmlns:a16="http://schemas.microsoft.com/office/drawing/2014/main" w="9525">
+              <a14:hiddenLine xmlns:a16="http://schemas.microsoft.com/office/drawing/2014/main" xmlns:p14="http://schemas.microsoft.com/office/powerpoint/2010/main" xmlns:a14="http://schemas.microsoft.com/office/drawing/2010/main" xmlns="" w="9525">
                 <a:solidFill>
                   <a:srgbClr val="000000"/>
                 </a:solidFill>

</xml_diff>